<commit_message>
control task added + other minor changes
</commit_message>
<xml_diff>
--- a/DPD_task/stimuli/instructions/instructionsDPD.pptx
+++ b/DPD_task/stimuli/instructions/instructionsDPD.pptx
@@ -17,7 +17,11 @@
     <p:sldId id="276" r:id="rId11"/>
     <p:sldId id="287" r:id="rId12"/>
     <p:sldId id="301" r:id="rId13"/>
-    <p:sldId id="300" r:id="rId14"/>
+    <p:sldId id="303" r:id="rId14"/>
+    <p:sldId id="304" r:id="rId15"/>
+    <p:sldId id="306" r:id="rId16"/>
+    <p:sldId id="307" r:id="rId17"/>
+    <p:sldId id="300" r:id="rId18"/>
   </p:sldIdLst>
   <p:sldSz cx="12192000" cy="6858000"/>
   <p:notesSz cx="6858000" cy="9144000"/>
@@ -253,7 +257,7 @@
           <a:p>
             <a:fld id="{712DDF4E-9AD6-4EE5-9343-468C572CABA6}" type="datetimeFigureOut">
               <a:rPr lang="fr-FR" smtClean="0"/>
-              <a:t>05/05/2020</a:t>
+              <a:t>06/05/2020</a:t>
             </a:fld>
             <a:endParaRPr lang="fr-FR" dirty="0"/>
           </a:p>
@@ -421,7 +425,7 @@
           <a:p>
             <a:fld id="{712DDF4E-9AD6-4EE5-9343-468C572CABA6}" type="datetimeFigureOut">
               <a:rPr lang="fr-FR" smtClean="0"/>
-              <a:t>05/05/2020</a:t>
+              <a:t>06/05/2020</a:t>
             </a:fld>
             <a:endParaRPr lang="fr-FR" dirty="0"/>
           </a:p>
@@ -599,7 +603,7 @@
           <a:p>
             <a:fld id="{712DDF4E-9AD6-4EE5-9343-468C572CABA6}" type="datetimeFigureOut">
               <a:rPr lang="fr-FR" smtClean="0"/>
-              <a:t>05/05/2020</a:t>
+              <a:t>06/05/2020</a:t>
             </a:fld>
             <a:endParaRPr lang="fr-FR" dirty="0"/>
           </a:p>
@@ -767,7 +771,7 @@
           <a:p>
             <a:fld id="{712DDF4E-9AD6-4EE5-9343-468C572CABA6}" type="datetimeFigureOut">
               <a:rPr lang="fr-FR" smtClean="0"/>
-              <a:t>05/05/2020</a:t>
+              <a:t>06/05/2020</a:t>
             </a:fld>
             <a:endParaRPr lang="fr-FR" dirty="0"/>
           </a:p>
@@ -1012,7 +1016,7 @@
           <a:p>
             <a:fld id="{712DDF4E-9AD6-4EE5-9343-468C572CABA6}" type="datetimeFigureOut">
               <a:rPr lang="fr-FR" smtClean="0"/>
-              <a:t>05/05/2020</a:t>
+              <a:t>06/05/2020</a:t>
             </a:fld>
             <a:endParaRPr lang="fr-FR" dirty="0"/>
           </a:p>
@@ -1241,7 +1245,7 @@
           <a:p>
             <a:fld id="{712DDF4E-9AD6-4EE5-9343-468C572CABA6}" type="datetimeFigureOut">
               <a:rPr lang="fr-FR" smtClean="0"/>
-              <a:t>05/05/2020</a:t>
+              <a:t>06/05/2020</a:t>
             </a:fld>
             <a:endParaRPr lang="fr-FR" dirty="0"/>
           </a:p>
@@ -1605,7 +1609,7 @@
           <a:p>
             <a:fld id="{712DDF4E-9AD6-4EE5-9343-468C572CABA6}" type="datetimeFigureOut">
               <a:rPr lang="fr-FR" smtClean="0"/>
-              <a:t>05/05/2020</a:t>
+              <a:t>06/05/2020</a:t>
             </a:fld>
             <a:endParaRPr lang="fr-FR" dirty="0"/>
           </a:p>
@@ -1722,7 +1726,7 @@
           <a:p>
             <a:fld id="{712DDF4E-9AD6-4EE5-9343-468C572CABA6}" type="datetimeFigureOut">
               <a:rPr lang="fr-FR" smtClean="0"/>
-              <a:t>05/05/2020</a:t>
+              <a:t>06/05/2020</a:t>
             </a:fld>
             <a:endParaRPr lang="fr-FR" dirty="0"/>
           </a:p>
@@ -1817,7 +1821,7 @@
           <a:p>
             <a:fld id="{712DDF4E-9AD6-4EE5-9343-468C572CABA6}" type="datetimeFigureOut">
               <a:rPr lang="fr-FR" smtClean="0"/>
-              <a:t>05/05/2020</a:t>
+              <a:t>06/05/2020</a:t>
             </a:fld>
             <a:endParaRPr lang="fr-FR" dirty="0"/>
           </a:p>
@@ -2092,7 +2096,7 @@
           <a:p>
             <a:fld id="{712DDF4E-9AD6-4EE5-9343-468C572CABA6}" type="datetimeFigureOut">
               <a:rPr lang="fr-FR" smtClean="0"/>
-              <a:t>05/05/2020</a:t>
+              <a:t>06/05/2020</a:t>
             </a:fld>
             <a:endParaRPr lang="fr-FR" dirty="0"/>
           </a:p>
@@ -2344,7 +2348,7 @@
           <a:p>
             <a:fld id="{712DDF4E-9AD6-4EE5-9343-468C572CABA6}" type="datetimeFigureOut">
               <a:rPr lang="fr-FR" smtClean="0"/>
-              <a:t>05/05/2020</a:t>
+              <a:t>06/05/2020</a:t>
             </a:fld>
             <a:endParaRPr lang="fr-FR" dirty="0"/>
           </a:p>
@@ -2555,7 +2559,7 @@
           <a:p>
             <a:fld id="{712DDF4E-9AD6-4EE5-9343-468C572CABA6}" type="datetimeFigureOut">
               <a:rPr lang="fr-FR" smtClean="0"/>
-              <a:t>05/05/2020</a:t>
+              <a:t>06/05/2020</a:t>
             </a:fld>
             <a:endParaRPr lang="fr-FR" dirty="0"/>
           </a:p>
@@ -3907,6 +3911,1208 @@
         </p:nvSpPr>
         <p:spPr>
           <a:xfrm>
+            <a:off x="2719162" y="1570148"/>
+            <a:ext cx="7009707" cy="2129977"/>
+          </a:xfrm>
+        </p:spPr>
+        <p:txBody>
+          <a:bodyPr>
+            <a:normAutofit/>
+          </a:bodyPr>
+          <a:lstStyle/>
+          <a:p>
+            <a:pPr algn="ctr"/>
+            <a:r>
+              <a:rPr lang="fr-FR" dirty="0"/>
+              <a:t>Jeu des Ecosystèmes</a:t>
+            </a:r>
+          </a:p>
+        </p:txBody>
+      </p:sp>
+      <p:sp>
+        <p:nvSpPr>
+          <p:cNvPr id="3" name="Rectángulo 2">
+            <a:extLst>
+              <a:ext uri="{FF2B5EF4-FFF2-40B4-BE49-F238E27FC236}">
+                <a16:creationId xmlns:a16="http://schemas.microsoft.com/office/drawing/2014/main" id="{EA7F033E-7ED6-294E-93DA-0440AE30B9E1}"/>
+              </a:ext>
+            </a:extLst>
+          </p:cNvPr>
+          <p:cNvSpPr/>
+          <p:nvPr/>
+        </p:nvSpPr>
+        <p:spPr>
+          <a:xfrm>
+            <a:off x="1975104" y="3522703"/>
+            <a:ext cx="8497824" cy="707886"/>
+          </a:xfrm>
+          <a:prstGeom prst="rect">
+            <a:avLst/>
+          </a:prstGeom>
+        </p:spPr>
+        <p:txBody>
+          <a:bodyPr wrap="square">
+            <a:spAutoFit/>
+          </a:bodyPr>
+          <a:lstStyle/>
+          <a:p>
+            <a:pPr algn="ctr"/>
+            <a:r>
+              <a:rPr lang="fr-FR" sz="2000" dirty="0"/>
+              <a:t>Nous évaluerons votre capacité à </a:t>
+            </a:r>
+            <a:r>
+              <a:rPr lang="fr-FR" sz="2000" dirty="0">
+                <a:solidFill>
+                  <a:srgbClr val="FF0000"/>
+                </a:solidFill>
+              </a:rPr>
+              <a:t>apprendre et comprendre, en présence d'incertitude, une règle cachée </a:t>
+            </a:r>
+            <a:r>
+              <a:rPr lang="fr-FR" sz="2000" dirty="0"/>
+              <a:t>qui permet d'établir une prévision fiable.</a:t>
+            </a:r>
+            <a:endParaRPr lang="es-FR" sz="2000" dirty="0"/>
+          </a:p>
+        </p:txBody>
+      </p:sp>
+      <p:sp>
+        <p:nvSpPr>
+          <p:cNvPr id="5" name="Rectangle 3">
+            <a:extLst>
+              <a:ext uri="{FF2B5EF4-FFF2-40B4-BE49-F238E27FC236}">
+                <a16:creationId xmlns:a16="http://schemas.microsoft.com/office/drawing/2014/main" id="{D1E306A8-AF16-F644-98D9-0F53FCDF400D}"/>
+              </a:ext>
+            </a:extLst>
+          </p:cNvPr>
+          <p:cNvSpPr/>
+          <p:nvPr/>
+        </p:nvSpPr>
+        <p:spPr>
+          <a:xfrm>
+            <a:off x="3551393" y="6183144"/>
+            <a:ext cx="5089214" cy="400110"/>
+          </a:xfrm>
+          <a:prstGeom prst="rect">
+            <a:avLst/>
+          </a:prstGeom>
+        </p:spPr>
+        <p:txBody>
+          <a:bodyPr wrap="none">
+            <a:spAutoFit/>
+          </a:bodyPr>
+          <a:lstStyle/>
+          <a:p>
+            <a:r>
+              <a:rPr lang="fr-FR" sz="2000" i="1" dirty="0">
+                <a:solidFill>
+                  <a:schemeClr val="tx1">
+                    <a:lumMod val="50000"/>
+                    <a:lumOff val="50000"/>
+                  </a:schemeClr>
+                </a:solidFill>
+              </a:rPr>
+              <a:t>Appuyez sur la flèche droite [</a:t>
+            </a:r>
+            <a:r>
+              <a:rPr lang="fr-FR" sz="2000" i="1" dirty="0">
+                <a:solidFill>
+                  <a:schemeClr val="tx1">
+                    <a:lumMod val="50000"/>
+                    <a:lumOff val="50000"/>
+                  </a:schemeClr>
+                </a:solidFill>
+                <a:sym typeface="Wingdings" pitchFamily="2" charset="2"/>
+              </a:rPr>
+              <a:t></a:t>
+            </a:r>
+            <a:r>
+              <a:rPr lang="fr-FR" sz="2000" i="1" dirty="0">
+                <a:solidFill>
+                  <a:schemeClr val="tx1">
+                    <a:lumMod val="50000"/>
+                    <a:lumOff val="50000"/>
+                  </a:schemeClr>
+                </a:solidFill>
+              </a:rPr>
+              <a:t>] pour continuer</a:t>
+            </a:r>
+          </a:p>
+        </p:txBody>
+      </p:sp>
+    </p:spTree>
+    <p:extLst>
+      <p:ext uri="{BB962C8B-B14F-4D97-AF65-F5344CB8AC3E}">
+        <p14:creationId xmlns:p14="http://schemas.microsoft.com/office/powerpoint/2010/main" val="61276001"/>
+      </p:ext>
+    </p:extLst>
+  </p:cSld>
+  <p:clrMapOvr>
+    <a:masterClrMapping/>
+  </p:clrMapOvr>
+</p:sld>
+</file>
+
+<file path=ppt/slides/slide14.xml><?xml version="1.0" encoding="utf-8"?>
+<p:sld xmlns:a="http://schemas.openxmlformats.org/drawingml/2006/main" xmlns:r="http://schemas.openxmlformats.org/officeDocument/2006/relationships" xmlns:p="http://schemas.openxmlformats.org/presentationml/2006/main">
+  <p:cSld>
+    <p:spTree>
+      <p:nvGrpSpPr>
+        <p:cNvPr id="1" name=""/>
+        <p:cNvGrpSpPr/>
+        <p:nvPr/>
+      </p:nvGrpSpPr>
+      <p:grpSpPr>
+        <a:xfrm>
+          <a:off x="0" y="0"/>
+          <a:ext cx="0" cy="0"/>
+          <a:chOff x="0" y="0"/>
+          <a:chExt cx="0" cy="0"/>
+        </a:xfrm>
+      </p:grpSpPr>
+      <p:sp>
+        <p:nvSpPr>
+          <p:cNvPr id="3" name="Espace réservé du contenu 2"/>
+          <p:cNvSpPr>
+            <a:spLocks noGrp="1"/>
+          </p:cNvSpPr>
+          <p:nvPr>
+            <p:ph idx="1"/>
+          </p:nvPr>
+        </p:nvSpPr>
+        <p:spPr>
+          <a:xfrm>
+            <a:off x="838200" y="1072896"/>
+            <a:ext cx="10515600" cy="4513257"/>
+          </a:xfrm>
+        </p:spPr>
+        <p:txBody>
+          <a:bodyPr>
+            <a:normAutofit/>
+          </a:bodyPr>
+          <a:lstStyle/>
+          <a:p>
+            <a:pPr marL="0" indent="0" algn="just">
+              <a:buNone/>
+            </a:pPr>
+            <a:r>
+              <a:rPr lang="fr-FR" sz="2000" dirty="0"/>
+              <a:t>Nous allons vous demander de comparer des écosystèmes virtuels, composés de plantes dont la croissance naturelle est variable. En particulier, les écosystèmes diffèrent par:</a:t>
+            </a:r>
+          </a:p>
+          <a:p>
+            <a:pPr algn="just">
+              <a:buFontTx/>
+              <a:buChar char="-"/>
+            </a:pPr>
+            <a:r>
+              <a:rPr lang="fr-FR" sz="2000" dirty="0"/>
+              <a:t>La </a:t>
+            </a:r>
+            <a:r>
+              <a:rPr lang="fr-FR" sz="2000" dirty="0">
+                <a:solidFill>
+                  <a:srgbClr val="FF0000"/>
+                </a:solidFill>
+              </a:rPr>
+              <a:t>fertilité des plantes </a:t>
+            </a:r>
+            <a:r>
+              <a:rPr lang="fr-FR" sz="2000" dirty="0"/>
+              <a:t>(certaines peuvent être incapables de se reproduire) </a:t>
+            </a:r>
+          </a:p>
+          <a:p>
+            <a:pPr algn="just">
+              <a:buFontTx/>
+              <a:buChar char="-"/>
+            </a:pPr>
+            <a:r>
+              <a:rPr lang="fr-FR" sz="2000" dirty="0"/>
+              <a:t>Le </a:t>
+            </a:r>
+            <a:r>
+              <a:rPr lang="fr-FR" sz="2000" dirty="0">
+                <a:solidFill>
+                  <a:srgbClr val="FF0000"/>
+                </a:solidFill>
+              </a:rPr>
+              <a:t>taux de plantes en contact avec des prédateurs </a:t>
+            </a:r>
+            <a:r>
+              <a:rPr lang="fr-FR" sz="2000" dirty="0"/>
+              <a:t>(p. ex. : des herbivores comme des insectes). </a:t>
+            </a:r>
+          </a:p>
+          <a:p>
+            <a:pPr marL="0" indent="0" algn="just">
+              <a:buNone/>
+            </a:pPr>
+            <a:endParaRPr lang="fr-FR" sz="2000" dirty="0"/>
+          </a:p>
+          <a:p>
+            <a:pPr marL="0" indent="0" algn="just">
+              <a:buNone/>
+            </a:pPr>
+            <a:r>
+              <a:rPr lang="fr-FR" sz="2000" dirty="0"/>
+              <a:t>Vous devrez essayer de deviner lequel des deux écosystèmes aura donné le plus de plantes au bout d'un an. </a:t>
+            </a:r>
+          </a:p>
+          <a:p>
+            <a:pPr marL="0" indent="0" algn="just">
+              <a:buNone/>
+            </a:pPr>
+            <a:r>
+              <a:rPr lang="fr-FR" sz="2000" dirty="0"/>
+              <a:t>Après chacune de vos prévisions, nous vous donnerons la bonne réponse. Cela vous permettra d'améliorer progressivement votre compréhension du problème. </a:t>
+            </a:r>
+          </a:p>
+          <a:p>
+            <a:pPr marL="0" indent="0" algn="just">
+              <a:buNone/>
+            </a:pPr>
+            <a:r>
+              <a:rPr lang="fr-FR" sz="2000" dirty="0"/>
+              <a:t>Ici, nous évaluons votre capacité à apprendre et comprendre, en présence d'incertitude, une règle cachée qui permet d'établir une prévision fiable. </a:t>
+            </a:r>
+          </a:p>
+        </p:txBody>
+      </p:sp>
+      <p:sp>
+        <p:nvSpPr>
+          <p:cNvPr id="5" name="Rectángulo 4">
+            <a:extLst>
+              <a:ext uri="{FF2B5EF4-FFF2-40B4-BE49-F238E27FC236}">
+                <a16:creationId xmlns:a16="http://schemas.microsoft.com/office/drawing/2014/main" id="{7341A93F-6626-504F-B534-D779E9399A22}"/>
+              </a:ext>
+            </a:extLst>
+          </p:cNvPr>
+          <p:cNvSpPr/>
+          <p:nvPr/>
+        </p:nvSpPr>
+        <p:spPr>
+          <a:xfrm>
+            <a:off x="602559" y="432773"/>
+            <a:ext cx="2066591" cy="577850"/>
+          </a:xfrm>
+          <a:prstGeom prst="rect">
+            <a:avLst/>
+          </a:prstGeom>
+        </p:spPr>
+        <p:txBody>
+          <a:bodyPr wrap="none">
+            <a:spAutoFit/>
+          </a:bodyPr>
+          <a:lstStyle/>
+          <a:p>
+            <a:pPr algn="just">
+              <a:lnSpc>
+                <a:spcPct val="150000"/>
+              </a:lnSpc>
+              <a:spcBef>
+                <a:spcPts val="200"/>
+              </a:spcBef>
+              <a:spcAft>
+                <a:spcPts val="0"/>
+              </a:spcAft>
+            </a:pPr>
+            <a:r>
+              <a:rPr lang="fr-FR" sz="2400" b="1" dirty="0">
+                <a:solidFill>
+                  <a:srgbClr val="2E74B5"/>
+                </a:solidFill>
+                <a:latin typeface="Arial" panose="020B0604020202020204" pitchFamily="34" charset="0"/>
+                <a:cs typeface="Times New Roman" panose="02020603050405020304" pitchFamily="18" charset="0"/>
+              </a:rPr>
+              <a:t>Déroulement</a:t>
+            </a:r>
+            <a:endParaRPr lang="es-FR" b="1" dirty="0">
+              <a:solidFill>
+                <a:srgbClr val="2E74B5"/>
+              </a:solidFill>
+              <a:latin typeface="Arial" panose="020B0604020202020204" pitchFamily="34" charset="0"/>
+              <a:cs typeface="Times New Roman" panose="02020603050405020304" pitchFamily="18" charset="0"/>
+            </a:endParaRPr>
+          </a:p>
+        </p:txBody>
+      </p:sp>
+      <p:sp>
+        <p:nvSpPr>
+          <p:cNvPr id="6" name="Rectangle 3">
+            <a:extLst>
+              <a:ext uri="{FF2B5EF4-FFF2-40B4-BE49-F238E27FC236}">
+                <a16:creationId xmlns:a16="http://schemas.microsoft.com/office/drawing/2014/main" id="{950F77F6-D801-2A40-9828-736711F41D08}"/>
+              </a:ext>
+            </a:extLst>
+          </p:cNvPr>
+          <p:cNvSpPr/>
+          <p:nvPr/>
+        </p:nvSpPr>
+        <p:spPr>
+          <a:xfrm>
+            <a:off x="905636" y="6025117"/>
+            <a:ext cx="10380727" cy="400110"/>
+          </a:xfrm>
+          <a:prstGeom prst="rect">
+            <a:avLst/>
+          </a:prstGeom>
+        </p:spPr>
+        <p:txBody>
+          <a:bodyPr wrap="none">
+            <a:spAutoFit/>
+          </a:bodyPr>
+          <a:lstStyle/>
+          <a:p>
+            <a:r>
+              <a:rPr lang="fr-FR" sz="2000" i="1" dirty="0">
+                <a:solidFill>
+                  <a:schemeClr val="tx1">
+                    <a:lumMod val="50000"/>
+                    <a:lumOff val="50000"/>
+                  </a:schemeClr>
+                </a:solidFill>
+              </a:rPr>
+              <a:t>Appuyez sur la flèche droite [</a:t>
+            </a:r>
+            <a:r>
+              <a:rPr lang="fr-FR" sz="2000" i="1" dirty="0">
+                <a:solidFill>
+                  <a:schemeClr val="tx1">
+                    <a:lumMod val="50000"/>
+                    <a:lumOff val="50000"/>
+                  </a:schemeClr>
+                </a:solidFill>
+                <a:sym typeface="Wingdings" pitchFamily="2" charset="2"/>
+              </a:rPr>
+              <a:t></a:t>
+            </a:r>
+            <a:r>
+              <a:rPr lang="fr-FR" sz="2000" i="1" dirty="0">
+                <a:solidFill>
+                  <a:schemeClr val="tx1">
+                    <a:lumMod val="50000"/>
+                    <a:lumOff val="50000"/>
+                  </a:schemeClr>
+                </a:solidFill>
+              </a:rPr>
+              <a:t>] pour continuer ou sur la flèche gauche [</a:t>
+            </a:r>
+            <a:r>
+              <a:rPr lang="fr-FR" sz="2000" i="1" dirty="0">
+                <a:solidFill>
+                  <a:schemeClr val="tx1">
+                    <a:lumMod val="50000"/>
+                    <a:lumOff val="50000"/>
+                  </a:schemeClr>
+                </a:solidFill>
+                <a:sym typeface="Wingdings" pitchFamily="2" charset="2"/>
+              </a:rPr>
+              <a:t>] pour revenir en arrière</a:t>
+            </a:r>
+            <a:endParaRPr lang="fr-FR" sz="2000" i="1" dirty="0">
+              <a:solidFill>
+                <a:schemeClr val="tx1">
+                  <a:lumMod val="50000"/>
+                  <a:lumOff val="50000"/>
+                </a:schemeClr>
+              </a:solidFill>
+            </a:endParaRPr>
+          </a:p>
+        </p:txBody>
+      </p:sp>
+    </p:spTree>
+    <p:extLst>
+      <p:ext uri="{BB962C8B-B14F-4D97-AF65-F5344CB8AC3E}">
+        <p14:creationId xmlns:p14="http://schemas.microsoft.com/office/powerpoint/2010/main" val="197218460"/>
+      </p:ext>
+    </p:extLst>
+  </p:cSld>
+  <p:clrMapOvr>
+    <a:masterClrMapping/>
+  </p:clrMapOvr>
+</p:sld>
+</file>
+
+<file path=ppt/slides/slide15.xml><?xml version="1.0" encoding="utf-8"?>
+<p:sld xmlns:a="http://schemas.openxmlformats.org/drawingml/2006/main" xmlns:r="http://schemas.openxmlformats.org/officeDocument/2006/relationships" xmlns:p="http://schemas.openxmlformats.org/presentationml/2006/main">
+  <p:cSld>
+    <p:spTree>
+      <p:nvGrpSpPr>
+        <p:cNvPr id="1" name=""/>
+        <p:cNvGrpSpPr/>
+        <p:nvPr/>
+      </p:nvGrpSpPr>
+      <p:grpSpPr>
+        <a:xfrm>
+          <a:off x="0" y="0"/>
+          <a:ext cx="0" cy="0"/>
+          <a:chOff x="0" y="0"/>
+          <a:chExt cx="0" cy="0"/>
+        </a:xfrm>
+      </p:grpSpPr>
+      <p:sp>
+        <p:nvSpPr>
+          <p:cNvPr id="3" name="Espace réservé du contenu 2"/>
+          <p:cNvSpPr>
+            <a:spLocks noGrp="1"/>
+          </p:cNvSpPr>
+          <p:nvPr>
+            <p:ph idx="1"/>
+          </p:nvPr>
+        </p:nvSpPr>
+        <p:spPr>
+          <a:xfrm>
+            <a:off x="648245" y="716347"/>
+            <a:ext cx="10705555" cy="5653572"/>
+          </a:xfrm>
+        </p:spPr>
+        <p:txBody>
+          <a:bodyPr>
+            <a:normAutofit/>
+          </a:bodyPr>
+          <a:lstStyle/>
+          <a:p>
+            <a:pPr marL="0" indent="0" algn="just">
+              <a:buNone/>
+            </a:pPr>
+            <a:r>
+              <a:rPr lang="fr-FR" sz="1800" dirty="0"/>
+              <a:t>Cette tache se compose de </a:t>
+            </a:r>
+            <a:r>
+              <a:rPr lang="fr-FR" sz="1800" dirty="0">
+                <a:solidFill>
+                  <a:srgbClr val="FF0000"/>
+                </a:solidFill>
+              </a:rPr>
+              <a:t>34 essais</a:t>
+            </a:r>
+            <a:r>
+              <a:rPr lang="fr-FR" sz="1800" dirty="0"/>
+              <a:t>. A chaque essai, nous vous présentons deux écosystèmes, dont chacun commence l'année avec 80 plantes. Vous devrez deviner lequel de ces deux écosystèmes contiendra le plus de plantes au bout d'un an, en prenant compte des aspects suivants:</a:t>
+            </a:r>
+          </a:p>
+          <a:p>
+            <a:r>
+              <a:rPr lang="fr-FR" sz="1800" dirty="0"/>
+              <a:t> </a:t>
+            </a:r>
+            <a:r>
+              <a:rPr lang="fr-FR" sz="1800" dirty="0">
+                <a:solidFill>
+                  <a:srgbClr val="FF0000"/>
+                </a:solidFill>
+              </a:rPr>
+              <a:t>Succès de la reproduction</a:t>
+            </a:r>
+            <a:r>
+              <a:rPr lang="fr-FR" sz="1800" dirty="0"/>
+              <a:t>.  Plus les plantes réussissent à se reproduire, plus la quantité de plantes sera importante à la fin de l'année. Bien que le taux de reproduction des plantes soit inconnu a priori, vous saurez combien de ces plantes sont fertiles. </a:t>
+            </a:r>
+            <a:endParaRPr lang="es-FR" sz="1800" dirty="0"/>
+          </a:p>
+          <a:p>
+            <a:r>
+              <a:rPr lang="fr-FR" sz="1800" dirty="0"/>
+              <a:t> </a:t>
+            </a:r>
+            <a:r>
+              <a:rPr lang="fr-FR" sz="1800" dirty="0">
+                <a:solidFill>
+                  <a:srgbClr val="FF0000"/>
+                </a:solidFill>
+              </a:rPr>
+              <a:t>Fréquence du contact avec des prédateurs</a:t>
+            </a:r>
+            <a:r>
+              <a:rPr lang="fr-FR" sz="1800" dirty="0"/>
+              <a:t>. Plus les plantes sont en contact avec des prédateurs, moins la quantité de plantes sera importante à la fin de l'année. Bien que l'agressivité des prédateurs soit inconnu a priori, vous connaitrez la proportion P de plantes qui sont effectivement en contact avec le prédateur. Celle-ci sera représentée par la portion rouge d´un diagramme en camembert (voir la figure plus bas). Réciproquement, la portion verte du camembert représentera la proportion de plantes qui ne sont pas en contact avec les prédateurs.</a:t>
+            </a:r>
+          </a:p>
+          <a:p>
+            <a:pPr marL="0" indent="0">
+              <a:buNone/>
+            </a:pPr>
+            <a:endParaRPr lang="fr-FR" sz="1800" dirty="0"/>
+          </a:p>
+          <a:p>
+            <a:pPr marL="0" indent="0">
+              <a:buNone/>
+            </a:pPr>
+            <a:r>
+              <a:rPr lang="fr-FR" sz="1800" dirty="0">
+                <a:solidFill>
+                  <a:srgbClr val="FF0000"/>
+                </a:solidFill>
+              </a:rPr>
+              <a:t>                                        </a:t>
+            </a:r>
+          </a:p>
+          <a:p>
+            <a:pPr marL="0" indent="0" algn="just">
+              <a:buNone/>
+            </a:pPr>
+            <a:r>
+              <a:rPr lang="fr-FR" sz="1800" dirty="0"/>
+              <a:t>                                           </a:t>
+            </a:r>
+          </a:p>
+          <a:p>
+            <a:pPr marL="0" indent="0" algn="just">
+              <a:buNone/>
+            </a:pPr>
+            <a:r>
+              <a:rPr lang="fr-FR" sz="1800" dirty="0"/>
+              <a:t>                           Aucun contact avec des herbivores</a:t>
+            </a:r>
+          </a:p>
+          <a:p>
+            <a:pPr marL="0" indent="0" algn="just">
+              <a:buNone/>
+            </a:pPr>
+            <a:r>
+              <a:rPr lang="fr-FR" sz="1800" dirty="0"/>
+              <a:t>                            </a:t>
+            </a:r>
+          </a:p>
+          <a:p>
+            <a:pPr marL="0" indent="0" algn="just">
+              <a:buNone/>
+            </a:pPr>
+            <a:endParaRPr lang="fr-FR" sz="1800" dirty="0"/>
+          </a:p>
+        </p:txBody>
+      </p:sp>
+      <p:sp>
+        <p:nvSpPr>
+          <p:cNvPr id="5" name="Rectángulo 4">
+            <a:extLst>
+              <a:ext uri="{FF2B5EF4-FFF2-40B4-BE49-F238E27FC236}">
+                <a16:creationId xmlns:a16="http://schemas.microsoft.com/office/drawing/2014/main" id="{7341A93F-6626-504F-B534-D779E9399A22}"/>
+              </a:ext>
+            </a:extLst>
+          </p:cNvPr>
+          <p:cNvSpPr/>
+          <p:nvPr/>
+        </p:nvSpPr>
+        <p:spPr>
+          <a:xfrm>
+            <a:off x="648245" y="237429"/>
+            <a:ext cx="1752403" cy="496996"/>
+          </a:xfrm>
+          <a:prstGeom prst="rect">
+            <a:avLst/>
+          </a:prstGeom>
+        </p:spPr>
+        <p:txBody>
+          <a:bodyPr wrap="none">
+            <a:spAutoFit/>
+          </a:bodyPr>
+          <a:lstStyle/>
+          <a:p>
+            <a:pPr algn="just">
+              <a:lnSpc>
+                <a:spcPct val="150000"/>
+              </a:lnSpc>
+              <a:spcBef>
+                <a:spcPts val="200"/>
+              </a:spcBef>
+              <a:spcAft>
+                <a:spcPts val="0"/>
+              </a:spcAft>
+            </a:pPr>
+            <a:r>
+              <a:rPr lang="fr-FR" sz="2000" b="1" dirty="0">
+                <a:solidFill>
+                  <a:srgbClr val="2E74B5"/>
+                </a:solidFill>
+                <a:latin typeface="Arial" panose="020B0604020202020204" pitchFamily="34" charset="0"/>
+                <a:cs typeface="Times New Roman" panose="02020603050405020304" pitchFamily="18" charset="0"/>
+              </a:rPr>
+              <a:t>Déroulement</a:t>
+            </a:r>
+          </a:p>
+        </p:txBody>
+      </p:sp>
+      <p:sp>
+        <p:nvSpPr>
+          <p:cNvPr id="6" name="Rectangle 3">
+            <a:extLst>
+              <a:ext uri="{FF2B5EF4-FFF2-40B4-BE49-F238E27FC236}">
+                <a16:creationId xmlns:a16="http://schemas.microsoft.com/office/drawing/2014/main" id="{4B90CD4B-3742-F444-BED2-24C4FA254327}"/>
+              </a:ext>
+            </a:extLst>
+          </p:cNvPr>
+          <p:cNvSpPr/>
+          <p:nvPr/>
+        </p:nvSpPr>
+        <p:spPr>
+          <a:xfrm>
+            <a:off x="905636" y="6275982"/>
+            <a:ext cx="10380727" cy="400110"/>
+          </a:xfrm>
+          <a:prstGeom prst="rect">
+            <a:avLst/>
+          </a:prstGeom>
+        </p:spPr>
+        <p:txBody>
+          <a:bodyPr wrap="none">
+            <a:spAutoFit/>
+          </a:bodyPr>
+          <a:lstStyle/>
+          <a:p>
+            <a:r>
+              <a:rPr lang="fr-FR" sz="2000" i="1" dirty="0">
+                <a:solidFill>
+                  <a:schemeClr val="tx1">
+                    <a:lumMod val="50000"/>
+                    <a:lumOff val="50000"/>
+                  </a:schemeClr>
+                </a:solidFill>
+              </a:rPr>
+              <a:t>Appuyez sur la flèche droite [</a:t>
+            </a:r>
+            <a:r>
+              <a:rPr lang="fr-FR" sz="2000" i="1" dirty="0">
+                <a:solidFill>
+                  <a:schemeClr val="tx1">
+                    <a:lumMod val="50000"/>
+                    <a:lumOff val="50000"/>
+                  </a:schemeClr>
+                </a:solidFill>
+                <a:sym typeface="Wingdings" pitchFamily="2" charset="2"/>
+              </a:rPr>
+              <a:t></a:t>
+            </a:r>
+            <a:r>
+              <a:rPr lang="fr-FR" sz="2000" i="1" dirty="0">
+                <a:solidFill>
+                  <a:schemeClr val="tx1">
+                    <a:lumMod val="50000"/>
+                    <a:lumOff val="50000"/>
+                  </a:schemeClr>
+                </a:solidFill>
+              </a:rPr>
+              <a:t>] pour continuer ou sur la flèche gauche [</a:t>
+            </a:r>
+            <a:r>
+              <a:rPr lang="fr-FR" sz="2000" i="1" dirty="0">
+                <a:solidFill>
+                  <a:schemeClr val="tx1">
+                    <a:lumMod val="50000"/>
+                    <a:lumOff val="50000"/>
+                  </a:schemeClr>
+                </a:solidFill>
+                <a:sym typeface="Wingdings" pitchFamily="2" charset="2"/>
+              </a:rPr>
+              <a:t>] pour revenir en arrière</a:t>
+            </a:r>
+            <a:endParaRPr lang="fr-FR" sz="2000" i="1" dirty="0">
+              <a:solidFill>
+                <a:schemeClr val="tx1">
+                  <a:lumMod val="50000"/>
+                  <a:lumOff val="50000"/>
+                </a:schemeClr>
+              </a:solidFill>
+            </a:endParaRPr>
+          </a:p>
+        </p:txBody>
+      </p:sp>
+      <p:sp>
+        <p:nvSpPr>
+          <p:cNvPr id="2" name="CuadroTexto 1">
+            <a:extLst>
+              <a:ext uri="{FF2B5EF4-FFF2-40B4-BE49-F238E27FC236}">
+                <a16:creationId xmlns:a16="http://schemas.microsoft.com/office/drawing/2014/main" id="{84F0600F-7E63-A04A-B978-D862BB883491}"/>
+              </a:ext>
+            </a:extLst>
+          </p:cNvPr>
+          <p:cNvSpPr txBox="1"/>
+          <p:nvPr/>
+        </p:nvSpPr>
+        <p:spPr>
+          <a:xfrm>
+            <a:off x="2400648" y="3719478"/>
+            <a:ext cx="7653493" cy="1477328"/>
+          </a:xfrm>
+          <a:prstGeom prst="rect">
+            <a:avLst/>
+          </a:prstGeom>
+          <a:noFill/>
+        </p:spPr>
+        <p:txBody>
+          <a:bodyPr wrap="square" rtlCol="0">
+            <a:spAutoFit/>
+          </a:bodyPr>
+          <a:lstStyle/>
+          <a:p>
+            <a:pPr algn="just"/>
+            <a:endParaRPr lang="fr-FR" dirty="0"/>
+          </a:p>
+          <a:p>
+            <a:pPr algn="just"/>
+            <a:endParaRPr lang="fr-FR" dirty="0"/>
+          </a:p>
+          <a:p>
+            <a:pPr algn="just"/>
+            <a:r>
+              <a:rPr lang="fr-FR" dirty="0"/>
+              <a:t>60 plantes sont fertiles                                           Toutes les plantes sont fertiles</a:t>
+            </a:r>
+          </a:p>
+          <a:p>
+            <a:pPr algn="just"/>
+            <a:endParaRPr lang="fr-FR" dirty="0"/>
+          </a:p>
+          <a:p>
+            <a:r>
+              <a:rPr lang="en-GB" dirty="0"/>
+              <a:t>                                                                   vs.</a:t>
+            </a:r>
+          </a:p>
+        </p:txBody>
+      </p:sp>
+      <p:pic>
+        <p:nvPicPr>
+          <p:cNvPr id="7" name="Imagen 6" descr="Imagen que contiene fruta, competencia de atletismo, cd&#10;&#10;Descripción generada automáticamente">
+            <a:extLst>
+              <a:ext uri="{FF2B5EF4-FFF2-40B4-BE49-F238E27FC236}">
+                <a16:creationId xmlns:a16="http://schemas.microsoft.com/office/drawing/2014/main" id="{CE7E1695-9971-E044-97C4-78170A2BFA48}"/>
+              </a:ext>
+            </a:extLst>
+          </p:cNvPr>
+          <p:cNvPicPr>
+            <a:picLocks noChangeAspect="1"/>
+          </p:cNvPicPr>
+          <p:nvPr/>
+        </p:nvPicPr>
+        <p:blipFill rotWithShape="1">
+          <a:blip r:embed="rId2">
+            <a:extLst>
+              <a:ext uri="{28A0092B-C50C-407E-A947-70E740481C1C}">
+                <a14:useLocalDpi xmlns:a14="http://schemas.microsoft.com/office/drawing/2010/main" val="0"/>
+              </a:ext>
+            </a:extLst>
+          </a:blip>
+          <a:srcRect l="16420" t="18963" r="14673" b="15062"/>
+          <a:stretch/>
+        </p:blipFill>
+        <p:spPr>
+          <a:xfrm>
+            <a:off x="7700120" y="4550917"/>
+            <a:ext cx="1591734" cy="1524000"/>
+          </a:xfrm>
+          <a:prstGeom prst="rect">
+            <a:avLst/>
+          </a:prstGeom>
+        </p:spPr>
+      </p:pic>
+      <p:sp>
+        <p:nvSpPr>
+          <p:cNvPr id="10" name="Rectángulo 9">
+            <a:extLst>
+              <a:ext uri="{FF2B5EF4-FFF2-40B4-BE49-F238E27FC236}">
+                <a16:creationId xmlns:a16="http://schemas.microsoft.com/office/drawing/2014/main" id="{DF90F87B-C33D-E549-9349-87E099859D8A}"/>
+              </a:ext>
+            </a:extLst>
+          </p:cNvPr>
+          <p:cNvSpPr/>
+          <p:nvPr/>
+        </p:nvSpPr>
+        <p:spPr>
+          <a:xfrm>
+            <a:off x="1928553" y="4126415"/>
+            <a:ext cx="8125588" cy="1964016"/>
+          </a:xfrm>
+          <a:prstGeom prst="rect">
+            <a:avLst/>
+          </a:prstGeom>
+          <a:noFill/>
+        </p:spPr>
+        <p:style>
+          <a:lnRef idx="2">
+            <a:schemeClr val="dk1"/>
+          </a:lnRef>
+          <a:fillRef idx="1">
+            <a:schemeClr val="lt1"/>
+          </a:fillRef>
+          <a:effectRef idx="0">
+            <a:schemeClr val="dk1"/>
+          </a:effectRef>
+          <a:fontRef idx="minor">
+            <a:schemeClr val="dk1"/>
+          </a:fontRef>
+        </p:style>
+        <p:txBody>
+          <a:bodyPr rtlCol="0" anchor="ctr"/>
+          <a:lstStyle/>
+          <a:p>
+            <a:pPr algn="ctr"/>
+            <a:endParaRPr lang="en-GB"/>
+          </a:p>
+        </p:txBody>
+      </p:sp>
+    </p:spTree>
+    <p:extLst>
+      <p:ext uri="{BB962C8B-B14F-4D97-AF65-F5344CB8AC3E}">
+        <p14:creationId xmlns:p14="http://schemas.microsoft.com/office/powerpoint/2010/main" val="2948591915"/>
+      </p:ext>
+    </p:extLst>
+  </p:cSld>
+  <p:clrMapOvr>
+    <a:masterClrMapping/>
+  </p:clrMapOvr>
+</p:sld>
+</file>
+
+<file path=ppt/slides/slide16.xml><?xml version="1.0" encoding="utf-8"?>
+<p:sld xmlns:a="http://schemas.openxmlformats.org/drawingml/2006/main" xmlns:r="http://schemas.openxmlformats.org/officeDocument/2006/relationships" xmlns:p="http://schemas.openxmlformats.org/presentationml/2006/main">
+  <p:cSld>
+    <p:spTree>
+      <p:nvGrpSpPr>
+        <p:cNvPr id="1" name=""/>
+        <p:cNvGrpSpPr/>
+        <p:nvPr/>
+      </p:nvGrpSpPr>
+      <p:grpSpPr>
+        <a:xfrm>
+          <a:off x="0" y="0"/>
+          <a:ext cx="0" cy="0"/>
+          <a:chOff x="0" y="0"/>
+          <a:chExt cx="0" cy="0"/>
+        </a:xfrm>
+      </p:grpSpPr>
+      <p:sp>
+        <p:nvSpPr>
+          <p:cNvPr id="3" name="Espace réservé du contenu 2"/>
+          <p:cNvSpPr>
+            <a:spLocks noGrp="1"/>
+          </p:cNvSpPr>
+          <p:nvPr>
+            <p:ph idx="1"/>
+          </p:nvPr>
+        </p:nvSpPr>
+        <p:spPr>
+          <a:xfrm>
+            <a:off x="648245" y="916402"/>
+            <a:ext cx="10705555" cy="5653572"/>
+          </a:xfrm>
+        </p:spPr>
+        <p:txBody>
+          <a:bodyPr>
+            <a:normAutofit lnSpcReduction="10000"/>
+          </a:bodyPr>
+          <a:lstStyle/>
+          <a:p>
+            <a:pPr marL="0" indent="0" algn="just">
+              <a:buNone/>
+            </a:pPr>
+            <a:r>
+              <a:rPr lang="fr-FR" sz="2000" dirty="0"/>
+              <a:t>Dans cette tache, pour certains essais, on vous demandera d’exprimer votre </a:t>
+            </a:r>
+            <a:r>
+              <a:rPr lang="fr-FR" sz="2000" dirty="0">
+                <a:solidFill>
+                  <a:srgbClr val="FF0000"/>
+                </a:solidFill>
+              </a:rPr>
+              <a:t>degré de certitude </a:t>
+            </a:r>
+            <a:r>
+              <a:rPr lang="fr-FR" sz="2000" dirty="0"/>
+              <a:t>quant à votre prédiction (à quel point vous êtes confiant en votre prédiction) avant de vous dire si vous avez eu raison. </a:t>
+            </a:r>
+          </a:p>
+          <a:p>
+            <a:pPr marL="0" indent="0" algn="just">
+              <a:buNone/>
+            </a:pPr>
+            <a:endParaRPr lang="fr-FR" sz="2000" dirty="0"/>
+          </a:p>
+          <a:p>
+            <a:pPr marL="0" indent="0" algn="just">
+              <a:buNone/>
+            </a:pPr>
+            <a:r>
+              <a:rPr lang="fr-FR" sz="2000" dirty="0"/>
+              <a:t>Pour répondre, vous déplacerez le pointeur de la barre de défilement avec la souris (voir figure prochaine). </a:t>
+            </a:r>
+          </a:p>
+          <a:p>
+            <a:pPr marL="0" indent="0" algn="just">
+              <a:buNone/>
+            </a:pPr>
+            <a:endParaRPr lang="fr-FR" sz="2000" dirty="0"/>
+          </a:p>
+          <a:p>
+            <a:pPr marL="0" indent="0" algn="just">
+              <a:buNone/>
+            </a:pPr>
+            <a:endParaRPr lang="fr-FR" sz="2000" dirty="0"/>
+          </a:p>
+          <a:p>
+            <a:pPr marL="0" indent="0" algn="just">
+              <a:buNone/>
+            </a:pPr>
+            <a:endParaRPr lang="fr-FR" sz="2000" dirty="0"/>
+          </a:p>
+          <a:p>
+            <a:pPr marL="0" indent="0" algn="just">
+              <a:buNone/>
+            </a:pPr>
+            <a:endParaRPr lang="fr-FR" sz="2000" dirty="0"/>
+          </a:p>
+          <a:p>
+            <a:pPr marL="0" indent="0" algn="just">
+              <a:buNone/>
+            </a:pPr>
+            <a:endParaRPr lang="fr-FR" sz="2000" dirty="0"/>
+          </a:p>
+          <a:p>
+            <a:pPr marL="0" indent="0" algn="just">
+              <a:buNone/>
+            </a:pPr>
+            <a:endParaRPr lang="fr-FR" sz="2000" dirty="0"/>
+          </a:p>
+          <a:p>
+            <a:pPr marL="0" indent="0" algn="just">
+              <a:buNone/>
+            </a:pPr>
+            <a:endParaRPr lang="fr-FR" sz="2000" dirty="0"/>
+          </a:p>
+          <a:p>
+            <a:pPr marL="0" indent="0" algn="just">
+              <a:buNone/>
+            </a:pPr>
+            <a:endParaRPr lang="fr-FR" sz="2000" dirty="0"/>
+          </a:p>
+          <a:p>
+            <a:pPr marL="0" indent="0" algn="just">
+              <a:buNone/>
+            </a:pPr>
+            <a:r>
+              <a:rPr lang="fr-FR" sz="2000" dirty="0"/>
+              <a:t>Si vous ne déplacez pas la barre avant d'appuyer sur le bouton OK, vous ne pourrez pas passer au essai suivant.</a:t>
+            </a:r>
+          </a:p>
+        </p:txBody>
+      </p:sp>
+      <p:sp>
+        <p:nvSpPr>
+          <p:cNvPr id="5" name="Rectángulo 4">
+            <a:extLst>
+              <a:ext uri="{FF2B5EF4-FFF2-40B4-BE49-F238E27FC236}">
+                <a16:creationId xmlns:a16="http://schemas.microsoft.com/office/drawing/2014/main" id="{7341A93F-6626-504F-B534-D779E9399A22}"/>
+              </a:ext>
+            </a:extLst>
+          </p:cNvPr>
+          <p:cNvSpPr/>
+          <p:nvPr/>
+        </p:nvSpPr>
+        <p:spPr>
+          <a:xfrm>
+            <a:off x="610574" y="259845"/>
+            <a:ext cx="4812536" cy="496996"/>
+          </a:xfrm>
+          <a:prstGeom prst="rect">
+            <a:avLst/>
+          </a:prstGeom>
+        </p:spPr>
+        <p:txBody>
+          <a:bodyPr wrap="none">
+            <a:spAutoFit/>
+          </a:bodyPr>
+          <a:lstStyle/>
+          <a:p>
+            <a:pPr algn="just">
+              <a:lnSpc>
+                <a:spcPct val="150000"/>
+              </a:lnSpc>
+              <a:spcBef>
+                <a:spcPts val="200"/>
+              </a:spcBef>
+              <a:spcAft>
+                <a:spcPts val="0"/>
+              </a:spcAft>
+            </a:pPr>
+            <a:r>
+              <a:rPr lang="fr-FR" sz="2000" b="1" dirty="0">
+                <a:solidFill>
+                  <a:srgbClr val="2E74B5"/>
+                </a:solidFill>
+                <a:latin typeface="Arial" panose="020B0604020202020204" pitchFamily="34" charset="0"/>
+                <a:cs typeface="Times New Roman" panose="02020603050405020304" pitchFamily="18" charset="0"/>
+              </a:rPr>
+              <a:t>Degré de certitude en votre prédiction</a:t>
+            </a:r>
+          </a:p>
+        </p:txBody>
+      </p:sp>
+      <p:pic>
+        <p:nvPicPr>
+          <p:cNvPr id="7" name="Imagen 6" descr="Captura de pantalla de un celular con texto&#10;&#10;Descripción generada automáticamente">
+            <a:extLst>
+              <a:ext uri="{FF2B5EF4-FFF2-40B4-BE49-F238E27FC236}">
+                <a16:creationId xmlns:a16="http://schemas.microsoft.com/office/drawing/2014/main" id="{485527D2-D048-7F45-8790-830E59B18651}"/>
+              </a:ext>
+            </a:extLst>
+          </p:cNvPr>
+          <p:cNvPicPr>
+            <a:picLocks noChangeAspect="1"/>
+          </p:cNvPicPr>
+          <p:nvPr/>
+        </p:nvPicPr>
+        <p:blipFill>
+          <a:blip r:embed="rId2">
+            <a:extLst>
+              <a:ext uri="{28A0092B-C50C-407E-A947-70E740481C1C}">
+                <a14:useLocalDpi xmlns:a14="http://schemas.microsoft.com/office/drawing/2010/main" val="0"/>
+              </a:ext>
+            </a:extLst>
+          </a:blip>
+          <a:stretch>
+            <a:fillRect/>
+          </a:stretch>
+        </p:blipFill>
+        <p:spPr>
+          <a:xfrm>
+            <a:off x="939800" y="2739715"/>
+            <a:ext cx="10414000" cy="2493879"/>
+          </a:xfrm>
+          <a:prstGeom prst="rect">
+            <a:avLst/>
+          </a:prstGeom>
+        </p:spPr>
+      </p:pic>
+      <p:sp>
+        <p:nvSpPr>
+          <p:cNvPr id="6" name="Rectangle 3">
+            <a:extLst>
+              <a:ext uri="{FF2B5EF4-FFF2-40B4-BE49-F238E27FC236}">
+                <a16:creationId xmlns:a16="http://schemas.microsoft.com/office/drawing/2014/main" id="{C49CE132-C670-544E-A6AB-88C14FAB759B}"/>
+              </a:ext>
+            </a:extLst>
+          </p:cNvPr>
+          <p:cNvSpPr/>
+          <p:nvPr/>
+        </p:nvSpPr>
+        <p:spPr>
+          <a:xfrm>
+            <a:off x="973073" y="6329490"/>
+            <a:ext cx="10380727" cy="400110"/>
+          </a:xfrm>
+          <a:prstGeom prst="rect">
+            <a:avLst/>
+          </a:prstGeom>
+        </p:spPr>
+        <p:txBody>
+          <a:bodyPr wrap="none">
+            <a:spAutoFit/>
+          </a:bodyPr>
+          <a:lstStyle/>
+          <a:p>
+            <a:r>
+              <a:rPr lang="fr-FR" sz="2000" i="1" dirty="0">
+                <a:solidFill>
+                  <a:schemeClr val="tx1">
+                    <a:lumMod val="50000"/>
+                    <a:lumOff val="50000"/>
+                  </a:schemeClr>
+                </a:solidFill>
+              </a:rPr>
+              <a:t>Appuyez sur la flèche droite [</a:t>
+            </a:r>
+            <a:r>
+              <a:rPr lang="fr-FR" sz="2000" i="1" dirty="0">
+                <a:solidFill>
+                  <a:schemeClr val="tx1">
+                    <a:lumMod val="50000"/>
+                    <a:lumOff val="50000"/>
+                  </a:schemeClr>
+                </a:solidFill>
+                <a:sym typeface="Wingdings" pitchFamily="2" charset="2"/>
+              </a:rPr>
+              <a:t></a:t>
+            </a:r>
+            <a:r>
+              <a:rPr lang="fr-FR" sz="2000" i="1" dirty="0">
+                <a:solidFill>
+                  <a:schemeClr val="tx1">
+                    <a:lumMod val="50000"/>
+                    <a:lumOff val="50000"/>
+                  </a:schemeClr>
+                </a:solidFill>
+              </a:rPr>
+              <a:t>] pour continuer ou sur la flèche gauche [</a:t>
+            </a:r>
+            <a:r>
+              <a:rPr lang="fr-FR" sz="2000" i="1" dirty="0">
+                <a:solidFill>
+                  <a:schemeClr val="tx1">
+                    <a:lumMod val="50000"/>
+                    <a:lumOff val="50000"/>
+                  </a:schemeClr>
+                </a:solidFill>
+                <a:sym typeface="Wingdings" pitchFamily="2" charset="2"/>
+              </a:rPr>
+              <a:t>] pour revenir en arrière</a:t>
+            </a:r>
+            <a:endParaRPr lang="fr-FR" sz="2000" i="1" dirty="0">
+              <a:solidFill>
+                <a:schemeClr val="tx1">
+                  <a:lumMod val="50000"/>
+                  <a:lumOff val="50000"/>
+                </a:schemeClr>
+              </a:solidFill>
+            </a:endParaRPr>
+          </a:p>
+        </p:txBody>
+      </p:sp>
+    </p:spTree>
+    <p:extLst>
+      <p:ext uri="{BB962C8B-B14F-4D97-AF65-F5344CB8AC3E}">
+        <p14:creationId xmlns:p14="http://schemas.microsoft.com/office/powerpoint/2010/main" val="3798455815"/>
+      </p:ext>
+    </p:extLst>
+  </p:cSld>
+  <p:clrMapOvr>
+    <a:masterClrMapping/>
+  </p:clrMapOvr>
+</p:sld>
+</file>
+
+<file path=ppt/slides/slide17.xml><?xml version="1.0" encoding="utf-8"?>
+<p:sld xmlns:a="http://schemas.openxmlformats.org/drawingml/2006/main" xmlns:r="http://schemas.openxmlformats.org/officeDocument/2006/relationships" xmlns:p="http://schemas.openxmlformats.org/presentationml/2006/main">
+  <p:cSld>
+    <p:spTree>
+      <p:nvGrpSpPr>
+        <p:cNvPr id="1" name=""/>
+        <p:cNvGrpSpPr/>
+        <p:nvPr/>
+      </p:nvGrpSpPr>
+      <p:grpSpPr>
+        <a:xfrm>
+          <a:off x="0" y="0"/>
+          <a:ext cx="0" cy="0"/>
+          <a:chOff x="0" y="0"/>
+          <a:chExt cx="0" cy="0"/>
+        </a:xfrm>
+      </p:grpSpPr>
+      <p:sp>
+        <p:nvSpPr>
+          <p:cNvPr id="2" name="Titre 1"/>
+          <p:cNvSpPr>
+            <a:spLocks noGrp="1"/>
+          </p:cNvSpPr>
+          <p:nvPr>
+            <p:ph type="title"/>
+          </p:nvPr>
+        </p:nvSpPr>
+        <p:spPr>
+          <a:xfrm>
             <a:off x="2591147" y="2364012"/>
             <a:ext cx="7009707" cy="2129977"/>
           </a:xfrm>
@@ -4744,7 +5950,7 @@
             </a:pPr>
             <a:r>
               <a:rPr lang="fr-FR" sz="1800" dirty="0"/>
-              <a:t>		  Garder 40 euros                            vs.</a:t>
+              <a:t>		  Garder 13 euros                                 vs.</a:t>
             </a:r>
           </a:p>
           <a:p>
@@ -4943,6 +6149,51 @@
                 </a:schemeClr>
               </a:solidFill>
             </a:endParaRPr>
+          </a:p>
+        </p:txBody>
+      </p:sp>
+      <p:sp>
+        <p:nvSpPr>
+          <p:cNvPr id="4" name="Rectángulo 3">
+            <a:extLst>
+              <a:ext uri="{FF2B5EF4-FFF2-40B4-BE49-F238E27FC236}">
+                <a16:creationId xmlns:a16="http://schemas.microsoft.com/office/drawing/2014/main" id="{B34BF889-E4E5-4A4D-9F95-F6683AE17FD0}"/>
+              </a:ext>
+            </a:extLst>
+          </p:cNvPr>
+          <p:cNvSpPr/>
+          <p:nvPr/>
+        </p:nvSpPr>
+        <p:spPr>
+          <a:xfrm>
+            <a:off x="2401824" y="3108960"/>
+            <a:ext cx="6888480" cy="2377440"/>
+          </a:xfrm>
+          <a:prstGeom prst="rect">
+            <a:avLst/>
+          </a:prstGeom>
+          <a:noFill/>
+        </p:spPr>
+        <p:style>
+          <a:lnRef idx="2">
+            <a:schemeClr val="dk1"/>
+          </a:lnRef>
+          <a:fillRef idx="1">
+            <a:schemeClr val="lt1"/>
+          </a:fillRef>
+          <a:effectRef idx="0">
+            <a:schemeClr val="dk1"/>
+          </a:effectRef>
+          <a:fontRef idx="minor">
+            <a:schemeClr val="dk1"/>
+          </a:fontRef>
+        </p:style>
+        <p:txBody>
+          <a:bodyPr rtlCol="0" anchor="ctr"/>
+          <a:lstStyle/>
+          <a:p>
+            <a:pPr algn="ctr"/>
+            <a:endParaRPr lang="en-GB"/>
           </a:p>
         </p:txBody>
       </p:sp>
@@ -5316,7 +6567,7 @@
             </a:pPr>
             <a:r>
               <a:rPr lang="fr-FR" sz="1900" dirty="0"/>
-              <a:t>		  Garder 40 euros                            vs. </a:t>
+              <a:t>		  Garder 13 euros                                vs. </a:t>
             </a:r>
           </a:p>
           <a:p>
@@ -5558,6 +6809,51 @@
                 </a:schemeClr>
               </a:solidFill>
             </a:endParaRPr>
+          </a:p>
+        </p:txBody>
+      </p:sp>
+      <p:sp>
+        <p:nvSpPr>
+          <p:cNvPr id="8" name="Rectángulo 7">
+            <a:extLst>
+              <a:ext uri="{FF2B5EF4-FFF2-40B4-BE49-F238E27FC236}">
+                <a16:creationId xmlns:a16="http://schemas.microsoft.com/office/drawing/2014/main" id="{3185A225-8110-D840-8071-BC74BD54C6B1}"/>
+              </a:ext>
+            </a:extLst>
+          </p:cNvPr>
+          <p:cNvSpPr/>
+          <p:nvPr/>
+        </p:nvSpPr>
+        <p:spPr>
+          <a:xfrm>
+            <a:off x="2380488" y="1383243"/>
+            <a:ext cx="7239000" cy="2999613"/>
+          </a:xfrm>
+          <a:prstGeom prst="rect">
+            <a:avLst/>
+          </a:prstGeom>
+          <a:noFill/>
+        </p:spPr>
+        <p:style>
+          <a:lnRef idx="2">
+            <a:schemeClr val="dk1"/>
+          </a:lnRef>
+          <a:fillRef idx="1">
+            <a:schemeClr val="lt1"/>
+          </a:fillRef>
+          <a:effectRef idx="0">
+            <a:schemeClr val="dk1"/>
+          </a:effectRef>
+          <a:fontRef idx="minor">
+            <a:schemeClr val="dk1"/>
+          </a:fontRef>
+        </p:style>
+        <p:txBody>
+          <a:bodyPr rtlCol="0" anchor="ctr"/>
+          <a:lstStyle/>
+          <a:p>
+            <a:pPr algn="ctr"/>
+            <a:endParaRPr lang="en-GB"/>
           </a:p>
         </p:txBody>
       </p:sp>

</xml_diff>

<commit_message>
task almost finished (only data saving is missing)
</commit_message>
<xml_diff>
--- a/DPD_task/stimuli/instructions/instructionsDPD.pptx
+++ b/DPD_task/stimuli/instructions/instructionsDPD.pptx
@@ -12,16 +12,17 @@
     <p:sldId id="293" r:id="rId6"/>
     <p:sldId id="296" r:id="rId7"/>
     <p:sldId id="297" r:id="rId8"/>
-    <p:sldId id="298" r:id="rId9"/>
-    <p:sldId id="302" r:id="rId10"/>
-    <p:sldId id="276" r:id="rId11"/>
-    <p:sldId id="287" r:id="rId12"/>
-    <p:sldId id="301" r:id="rId13"/>
-    <p:sldId id="303" r:id="rId14"/>
-    <p:sldId id="304" r:id="rId15"/>
-    <p:sldId id="306" r:id="rId16"/>
-    <p:sldId id="307" r:id="rId17"/>
-    <p:sldId id="300" r:id="rId18"/>
+    <p:sldId id="308" r:id="rId9"/>
+    <p:sldId id="298" r:id="rId10"/>
+    <p:sldId id="302" r:id="rId11"/>
+    <p:sldId id="276" r:id="rId12"/>
+    <p:sldId id="287" r:id="rId13"/>
+    <p:sldId id="301" r:id="rId14"/>
+    <p:sldId id="303" r:id="rId15"/>
+    <p:sldId id="304" r:id="rId16"/>
+    <p:sldId id="306" r:id="rId17"/>
+    <p:sldId id="307" r:id="rId18"/>
+    <p:sldId id="300" r:id="rId19"/>
   </p:sldIdLst>
   <p:sldSz cx="12192000" cy="6858000"/>
   <p:notesSz cx="6858000" cy="9144000"/>
@@ -257,7 +258,7 @@
           <a:p>
             <a:fld id="{712DDF4E-9AD6-4EE5-9343-468C572CABA6}" type="datetimeFigureOut">
               <a:rPr lang="fr-FR" smtClean="0"/>
-              <a:t>06/05/2020</a:t>
+              <a:t>07/05/2020</a:t>
             </a:fld>
             <a:endParaRPr lang="fr-FR" dirty="0"/>
           </a:p>
@@ -425,7 +426,7 @@
           <a:p>
             <a:fld id="{712DDF4E-9AD6-4EE5-9343-468C572CABA6}" type="datetimeFigureOut">
               <a:rPr lang="fr-FR" smtClean="0"/>
-              <a:t>06/05/2020</a:t>
+              <a:t>07/05/2020</a:t>
             </a:fld>
             <a:endParaRPr lang="fr-FR" dirty="0"/>
           </a:p>
@@ -603,7 +604,7 @@
           <a:p>
             <a:fld id="{712DDF4E-9AD6-4EE5-9343-468C572CABA6}" type="datetimeFigureOut">
               <a:rPr lang="fr-FR" smtClean="0"/>
-              <a:t>06/05/2020</a:t>
+              <a:t>07/05/2020</a:t>
             </a:fld>
             <a:endParaRPr lang="fr-FR" dirty="0"/>
           </a:p>
@@ -771,7 +772,7 @@
           <a:p>
             <a:fld id="{712DDF4E-9AD6-4EE5-9343-468C572CABA6}" type="datetimeFigureOut">
               <a:rPr lang="fr-FR" smtClean="0"/>
-              <a:t>06/05/2020</a:t>
+              <a:t>07/05/2020</a:t>
             </a:fld>
             <a:endParaRPr lang="fr-FR" dirty="0"/>
           </a:p>
@@ -1016,7 +1017,7 @@
           <a:p>
             <a:fld id="{712DDF4E-9AD6-4EE5-9343-468C572CABA6}" type="datetimeFigureOut">
               <a:rPr lang="fr-FR" smtClean="0"/>
-              <a:t>06/05/2020</a:t>
+              <a:t>07/05/2020</a:t>
             </a:fld>
             <a:endParaRPr lang="fr-FR" dirty="0"/>
           </a:p>
@@ -1245,7 +1246,7 @@
           <a:p>
             <a:fld id="{712DDF4E-9AD6-4EE5-9343-468C572CABA6}" type="datetimeFigureOut">
               <a:rPr lang="fr-FR" smtClean="0"/>
-              <a:t>06/05/2020</a:t>
+              <a:t>07/05/2020</a:t>
             </a:fld>
             <a:endParaRPr lang="fr-FR" dirty="0"/>
           </a:p>
@@ -1609,7 +1610,7 @@
           <a:p>
             <a:fld id="{712DDF4E-9AD6-4EE5-9343-468C572CABA6}" type="datetimeFigureOut">
               <a:rPr lang="fr-FR" smtClean="0"/>
-              <a:t>06/05/2020</a:t>
+              <a:t>07/05/2020</a:t>
             </a:fld>
             <a:endParaRPr lang="fr-FR" dirty="0"/>
           </a:p>
@@ -1726,7 +1727,7 @@
           <a:p>
             <a:fld id="{712DDF4E-9AD6-4EE5-9343-468C572CABA6}" type="datetimeFigureOut">
               <a:rPr lang="fr-FR" smtClean="0"/>
-              <a:t>06/05/2020</a:t>
+              <a:t>07/05/2020</a:t>
             </a:fld>
             <a:endParaRPr lang="fr-FR" dirty="0"/>
           </a:p>
@@ -1821,7 +1822,7 @@
           <a:p>
             <a:fld id="{712DDF4E-9AD6-4EE5-9343-468C572CABA6}" type="datetimeFigureOut">
               <a:rPr lang="fr-FR" smtClean="0"/>
-              <a:t>06/05/2020</a:t>
+              <a:t>07/05/2020</a:t>
             </a:fld>
             <a:endParaRPr lang="fr-FR" dirty="0"/>
           </a:p>
@@ -2096,7 +2097,7 @@
           <a:p>
             <a:fld id="{712DDF4E-9AD6-4EE5-9343-468C572CABA6}" type="datetimeFigureOut">
               <a:rPr lang="fr-FR" smtClean="0"/>
-              <a:t>06/05/2020</a:t>
+              <a:t>07/05/2020</a:t>
             </a:fld>
             <a:endParaRPr lang="fr-FR" dirty="0"/>
           </a:p>
@@ -2348,7 +2349,7 @@
           <a:p>
             <a:fld id="{712DDF4E-9AD6-4EE5-9343-468C572CABA6}" type="datetimeFigureOut">
               <a:rPr lang="fr-FR" smtClean="0"/>
-              <a:t>06/05/2020</a:t>
+              <a:t>07/05/2020</a:t>
             </a:fld>
             <a:endParaRPr lang="fr-FR" dirty="0"/>
           </a:p>
@@ -2559,7 +2560,7 @@
           <a:p>
             <a:fld id="{712DDF4E-9AD6-4EE5-9343-468C572CABA6}" type="datetimeFigureOut">
               <a:rPr lang="fr-FR" smtClean="0"/>
-              <a:t>06/05/2020</a:t>
+              <a:t>07/05/2020</a:t>
             </a:fld>
             <a:endParaRPr lang="fr-FR" dirty="0"/>
           </a:p>
@@ -3332,7 +3333,7 @@
       </p:grpSpPr>
       <p:sp>
         <p:nvSpPr>
-          <p:cNvPr id="5" name="Espace réservé du contenu 4"/>
+          <p:cNvPr id="3" name="Espace réservé du contenu 2"/>
           <p:cNvSpPr>
             <a:spLocks noGrp="1"/>
           </p:cNvSpPr>
@@ -3342,15 +3343,17 @@
         </p:nvSpPr>
         <p:spPr>
           <a:xfrm>
-            <a:off x="791787" y="2025680"/>
-            <a:ext cx="10608425" cy="4351338"/>
-          </a:xfrm>
-        </p:spPr>
-        <p:txBody>
-          <a:bodyPr/>
-          <a:lstStyle/>
-          <a:p>
-            <a:pPr marL="0" indent="0">
+            <a:off x="838200" y="2167695"/>
+            <a:ext cx="10515600" cy="4690305"/>
+          </a:xfrm>
+        </p:spPr>
+        <p:txBody>
+          <a:bodyPr>
+            <a:normAutofit/>
+          </a:bodyPr>
+          <a:lstStyle/>
+          <a:p>
+            <a:pPr marL="0" indent="0" algn="ctr">
               <a:buNone/>
             </a:pPr>
             <a:endParaRPr lang="fr-FR" sz="2000" dirty="0"/>
@@ -3361,17 +3364,17 @@
             </a:pPr>
             <a:r>
               <a:rPr lang="fr-FR" sz="2000" dirty="0"/>
-              <a:t>L’entrainement est désormais terminé.  Vous allez maintenant commencer le jeu. </a:t>
-            </a:r>
-          </a:p>
-          <a:p>
-            <a:pPr marL="0" indent="0">
+              <a:t>Vous aurez maintenant l'occasion de vous familiariser la tâche pendant certains essais.</a:t>
+            </a:r>
+          </a:p>
+          <a:p>
+            <a:pPr marL="0" indent="0" algn="ctr">
               <a:buNone/>
             </a:pPr>
             <a:endParaRPr lang="fr-FR" sz="2000" dirty="0"/>
           </a:p>
           <a:p>
-            <a:pPr marL="0" indent="0">
+            <a:pPr marL="0" indent="0" algn="ctr">
               <a:buNone/>
             </a:pPr>
             <a:endParaRPr lang="fr-FR" sz="2000" dirty="0"/>
@@ -3390,45 +3393,21 @@
                   <a:srgbClr val="FF0000"/>
                 </a:solidFill>
               </a:rPr>
-              <a:t>sera prise en compte</a:t>
+              <a:t>ne sera pas prise en compte </a:t>
             </a:r>
             <a:r>
               <a:rPr lang="fr-FR" sz="2000" dirty="0"/>
-              <a:t> pour votre bonus financier. </a:t>
-            </a:r>
-          </a:p>
-          <a:p>
-            <a:pPr marL="0" indent="0">
-              <a:buNone/>
-            </a:pPr>
-            <a:endParaRPr lang="fr-FR" sz="2000" dirty="0"/>
-          </a:p>
-          <a:p>
-            <a:pPr marL="0" indent="0">
-              <a:buNone/>
-            </a:pPr>
-            <a:endParaRPr lang="fr-FR" sz="2000" dirty="0"/>
-          </a:p>
-          <a:p>
-            <a:pPr marL="0" indent="0">
-              <a:buNone/>
-            </a:pPr>
-            <a:endParaRPr lang="fr-FR" sz="2000" dirty="0"/>
-          </a:p>
-          <a:p>
-            <a:pPr marL="0" indent="0">
-              <a:buNone/>
-            </a:pPr>
-            <a:endParaRPr lang="fr-FR" dirty="0"/>
-          </a:p>
-        </p:txBody>
-      </p:sp>
-      <p:sp>
-        <p:nvSpPr>
-          <p:cNvPr id="8" name="Titre 1">
+              <a:t>pour votre bonus financier. </a:t>
+            </a:r>
+          </a:p>
+        </p:txBody>
+      </p:sp>
+      <p:sp>
+        <p:nvSpPr>
+          <p:cNvPr id="7" name="Titre 1">
             <a:extLst>
               <a:ext uri="{FF2B5EF4-FFF2-40B4-BE49-F238E27FC236}">
-                <a16:creationId xmlns:a16="http://schemas.microsoft.com/office/drawing/2014/main" id="{20521D2B-EC16-7D4C-B167-A6D999618EE3}"/>
+                <a16:creationId xmlns:a16="http://schemas.microsoft.com/office/drawing/2014/main" id="{7636C7F2-D3B8-7D4C-9EBF-161B37C6DF05}"/>
               </a:ext>
             </a:extLst>
           </p:cNvPr>
@@ -3441,8 +3420,8 @@
         </p:nvSpPr>
         <p:spPr>
           <a:xfrm>
-            <a:off x="2493611" y="480982"/>
-            <a:ext cx="7009707" cy="2129977"/>
+            <a:off x="2493611" y="681037"/>
+            <a:ext cx="7576981" cy="2129977"/>
           </a:xfrm>
         </p:spPr>
         <p:txBody>
@@ -3454,17 +3433,17 @@
             <a:pPr algn="ctr"/>
             <a:r>
               <a:rPr lang="fr-FR" dirty="0"/>
-              <a:t>Fin d’entrainement</a:t>
-            </a:r>
-          </a:p>
-        </p:txBody>
-      </p:sp>
-      <p:sp>
-        <p:nvSpPr>
-          <p:cNvPr id="6" name="Rectangle 3">
+              <a:t>Entrainement – Phase Prédiction</a:t>
+            </a:r>
+          </a:p>
+        </p:txBody>
+      </p:sp>
+      <p:sp>
+        <p:nvSpPr>
+          <p:cNvPr id="5" name="Rectangle 3">
             <a:extLst>
               <a:ext uri="{FF2B5EF4-FFF2-40B4-BE49-F238E27FC236}">
-                <a16:creationId xmlns:a16="http://schemas.microsoft.com/office/drawing/2014/main" id="{08F612B9-A7F2-CD4B-8853-3F42027E847D}"/>
+                <a16:creationId xmlns:a16="http://schemas.microsoft.com/office/drawing/2014/main" id="{8D4A4AC5-717D-F343-BCBE-5E4E31179B80}"/>
               </a:ext>
             </a:extLst>
           </p:cNvPr>
@@ -3473,7 +3452,7 @@
         </p:nvSpPr>
         <p:spPr>
           <a:xfrm>
-            <a:off x="3551392" y="6176963"/>
+            <a:off x="3551393" y="6176963"/>
             <a:ext cx="5089214" cy="400110"/>
           </a:xfrm>
           <a:prstGeom prst="rect">
@@ -3526,7 +3505,7 @@
     </p:spTree>
     <p:extLst>
       <p:ext uri="{BB962C8B-B14F-4D97-AF65-F5344CB8AC3E}">
-        <p14:creationId xmlns:p14="http://schemas.microsoft.com/office/powerpoint/2010/main" val="3249193195"/>
+        <p14:creationId xmlns:p14="http://schemas.microsoft.com/office/powerpoint/2010/main" val="1201254129"/>
       </p:ext>
     </p:extLst>
   </p:cSld>
@@ -3555,7 +3534,106 @@
       </p:grpSpPr>
       <p:sp>
         <p:nvSpPr>
-          <p:cNvPr id="2" name="Titre 1"/>
+          <p:cNvPr id="5" name="Espace réservé du contenu 4"/>
+          <p:cNvSpPr>
+            <a:spLocks noGrp="1"/>
+          </p:cNvSpPr>
+          <p:nvPr>
+            <p:ph idx="1"/>
+          </p:nvPr>
+        </p:nvSpPr>
+        <p:spPr>
+          <a:xfrm>
+            <a:off x="791787" y="2025680"/>
+            <a:ext cx="10608425" cy="4351338"/>
+          </a:xfrm>
+        </p:spPr>
+        <p:txBody>
+          <a:bodyPr/>
+          <a:lstStyle/>
+          <a:p>
+            <a:pPr marL="0" indent="0">
+              <a:buNone/>
+            </a:pPr>
+            <a:endParaRPr lang="fr-FR" sz="2000" dirty="0"/>
+          </a:p>
+          <a:p>
+            <a:pPr marL="0" indent="0" algn="ctr">
+              <a:buNone/>
+            </a:pPr>
+            <a:r>
+              <a:rPr lang="fr-FR" sz="2000" dirty="0"/>
+              <a:t>L’entrainement est désormais terminé.  Vous allez maintenant commencer le jeu. </a:t>
+            </a:r>
+          </a:p>
+          <a:p>
+            <a:pPr marL="0" indent="0">
+              <a:buNone/>
+            </a:pPr>
+            <a:endParaRPr lang="fr-FR" sz="2000" dirty="0"/>
+          </a:p>
+          <a:p>
+            <a:pPr marL="0" indent="0">
+              <a:buNone/>
+            </a:pPr>
+            <a:endParaRPr lang="fr-FR" sz="2000" dirty="0"/>
+          </a:p>
+          <a:p>
+            <a:pPr marL="0" indent="0" algn="ctr">
+              <a:buNone/>
+            </a:pPr>
+            <a:r>
+              <a:rPr lang="fr-FR" sz="2000" dirty="0"/>
+              <a:t>Votre performance dans cette phase </a:t>
+            </a:r>
+            <a:r>
+              <a:rPr lang="fr-FR" sz="2000" dirty="0">
+                <a:solidFill>
+                  <a:srgbClr val="FF0000"/>
+                </a:solidFill>
+              </a:rPr>
+              <a:t>sera prise en compte</a:t>
+            </a:r>
+            <a:r>
+              <a:rPr lang="fr-FR" sz="2000" dirty="0"/>
+              <a:t> pour votre bonus financier. </a:t>
+            </a:r>
+          </a:p>
+          <a:p>
+            <a:pPr marL="0" indent="0">
+              <a:buNone/>
+            </a:pPr>
+            <a:endParaRPr lang="fr-FR" sz="2000" dirty="0"/>
+          </a:p>
+          <a:p>
+            <a:pPr marL="0" indent="0">
+              <a:buNone/>
+            </a:pPr>
+            <a:endParaRPr lang="fr-FR" sz="2000" dirty="0"/>
+          </a:p>
+          <a:p>
+            <a:pPr marL="0" indent="0">
+              <a:buNone/>
+            </a:pPr>
+            <a:endParaRPr lang="fr-FR" sz="2000" dirty="0"/>
+          </a:p>
+          <a:p>
+            <a:pPr marL="0" indent="0">
+              <a:buNone/>
+            </a:pPr>
+            <a:endParaRPr lang="fr-FR" dirty="0"/>
+          </a:p>
+        </p:txBody>
+      </p:sp>
+      <p:sp>
+        <p:nvSpPr>
+          <p:cNvPr id="8" name="Titre 1">
+            <a:extLst>
+              <a:ext uri="{FF2B5EF4-FFF2-40B4-BE49-F238E27FC236}">
+                <a16:creationId xmlns:a16="http://schemas.microsoft.com/office/drawing/2014/main" id="{20521D2B-EC16-7D4C-B167-A6D999618EE3}"/>
+              </a:ext>
+            </a:extLst>
+          </p:cNvPr>
           <p:cNvSpPr>
             <a:spLocks noGrp="1"/>
           </p:cNvSpPr>
@@ -3565,7 +3643,7 @@
         </p:nvSpPr>
         <p:spPr>
           <a:xfrm>
-            <a:off x="2591146" y="1952843"/>
+            <a:off x="2493611" y="480982"/>
             <a:ext cx="7009707" cy="2129977"/>
           </a:xfrm>
         </p:spPr>
@@ -3578,21 +3656,17 @@
             <a:pPr algn="ctr"/>
             <a:r>
               <a:rPr lang="fr-FR" dirty="0"/>
-              <a:t>Phase de Décision</a:t>
-            </a:r>
-            <a:br>
-              <a:rPr lang="fr-FR" dirty="0"/>
-            </a:br>
-            <a:endParaRPr lang="fr-FR" dirty="0"/>
-          </a:p>
-        </p:txBody>
-      </p:sp>
-      <p:sp>
-        <p:nvSpPr>
-          <p:cNvPr id="3" name="Rectángulo 2">
+              <a:t>Fin d’entrainement</a:t>
+            </a:r>
+          </a:p>
+        </p:txBody>
+      </p:sp>
+      <p:sp>
+        <p:nvSpPr>
+          <p:cNvPr id="6" name="Rectangle 3">
             <a:extLst>
               <a:ext uri="{FF2B5EF4-FFF2-40B4-BE49-F238E27FC236}">
-                <a16:creationId xmlns:a16="http://schemas.microsoft.com/office/drawing/2014/main" id="{FDF4A276-8EF1-5C49-B88E-71188E8EA0A3}"/>
+                <a16:creationId xmlns:a16="http://schemas.microsoft.com/office/drawing/2014/main" id="{08F612B9-A7F2-CD4B-8853-3F42027E847D}"/>
               </a:ext>
             </a:extLst>
           </p:cNvPr>
@@ -3601,54 +3675,7 @@
         </p:nvSpPr>
         <p:spPr>
           <a:xfrm>
-            <a:off x="2097022" y="3525587"/>
-            <a:ext cx="9095234" cy="400110"/>
-          </a:xfrm>
-          <a:prstGeom prst="rect">
-            <a:avLst/>
-          </a:prstGeom>
-        </p:spPr>
-        <p:txBody>
-          <a:bodyPr wrap="square">
-            <a:spAutoFit/>
-          </a:bodyPr>
-          <a:lstStyle/>
-          <a:p>
-            <a:pPr algn="just"/>
-            <a:r>
-              <a:rPr lang="fr-FR" sz="2000" dirty="0"/>
-              <a:t>Nous évaluerons </a:t>
-            </a:r>
-            <a:r>
-              <a:rPr lang="fr-FR" sz="2000" dirty="0">
-                <a:solidFill>
-                  <a:srgbClr val="FF0000"/>
-                </a:solidFill>
-              </a:rPr>
-              <a:t>votre prudence</a:t>
-            </a:r>
-            <a:r>
-              <a:rPr lang="fr-FR" sz="2000" dirty="0"/>
-              <a:t>, c´est-à-dire votre tendance à prendre des risques.</a:t>
-            </a:r>
-          </a:p>
-        </p:txBody>
-      </p:sp>
-      <p:sp>
-        <p:nvSpPr>
-          <p:cNvPr id="5" name="Rectangle 3">
-            <a:extLst>
-              <a:ext uri="{FF2B5EF4-FFF2-40B4-BE49-F238E27FC236}">
-                <a16:creationId xmlns:a16="http://schemas.microsoft.com/office/drawing/2014/main" id="{451BE0B6-F3DD-BC45-A6CC-3E722B5C2A43}"/>
-              </a:ext>
-            </a:extLst>
-          </p:cNvPr>
-          <p:cNvSpPr/>
-          <p:nvPr/>
-        </p:nvSpPr>
-        <p:spPr>
-          <a:xfrm>
-            <a:off x="4100032" y="6087380"/>
+            <a:off x="3551392" y="6176963"/>
             <a:ext cx="5089214" cy="400110"/>
           </a:xfrm>
           <a:prstGeom prst="rect">
@@ -3701,7 +3728,7 @@
     </p:spTree>
     <p:extLst>
       <p:ext uri="{BB962C8B-B14F-4D97-AF65-F5344CB8AC3E}">
-        <p14:creationId xmlns:p14="http://schemas.microsoft.com/office/powerpoint/2010/main" val="255671310"/>
+        <p14:creationId xmlns:p14="http://schemas.microsoft.com/office/powerpoint/2010/main" val="3249193195"/>
       </p:ext>
     </p:extLst>
   </p:cSld>
@@ -3740,7 +3767,7 @@
         </p:nvSpPr>
         <p:spPr>
           <a:xfrm>
-            <a:off x="2719162" y="1570148"/>
+            <a:off x="2591146" y="1952843"/>
             <a:ext cx="7009707" cy="2129977"/>
           </a:xfrm>
         </p:spPr>
@@ -3753,8 +3780,12 @@
             <a:pPr algn="ctr"/>
             <a:r>
               <a:rPr lang="fr-FR" dirty="0"/>
-              <a:t>Phase de Prédiction</a:t>
-            </a:r>
+              <a:t>Phase de Décision</a:t>
+            </a:r>
+            <a:br>
+              <a:rPr lang="fr-FR" dirty="0"/>
+            </a:br>
+            <a:endParaRPr lang="fr-FR" dirty="0"/>
           </a:p>
         </p:txBody>
       </p:sp>
@@ -3763,7 +3794,7 @@
           <p:cNvPr id="3" name="Rectángulo 2">
             <a:extLst>
               <a:ext uri="{FF2B5EF4-FFF2-40B4-BE49-F238E27FC236}">
-                <a16:creationId xmlns:a16="http://schemas.microsoft.com/office/drawing/2014/main" id="{EA7F033E-7ED6-294E-93DA-0440AE30B9E1}"/>
+                <a16:creationId xmlns:a16="http://schemas.microsoft.com/office/drawing/2014/main" id="{FDF4A276-8EF1-5C49-B88E-71188E8EA0A3}"/>
               </a:ext>
             </a:extLst>
           </p:cNvPr>
@@ -3772,8 +3803,8 @@
         </p:nvSpPr>
         <p:spPr>
           <a:xfrm>
-            <a:off x="1975104" y="3522703"/>
-            <a:ext cx="8497824" cy="707886"/>
+            <a:off x="2097022" y="3525587"/>
+            <a:ext cx="9095234" cy="400110"/>
           </a:xfrm>
           <a:prstGeom prst="rect">
             <a:avLst/>
@@ -3785,10 +3816,10 @@
           </a:bodyPr>
           <a:lstStyle/>
           <a:p>
-            <a:pPr algn="ctr"/>
+            <a:pPr algn="just"/>
             <a:r>
               <a:rPr lang="fr-FR" sz="2000" dirty="0"/>
-              <a:t>Nous évaluerons votre capacité à prédire les </a:t>
+              <a:t>Nous évaluerons </a:t>
             </a:r>
             <a:r>
               <a:rPr lang="fr-FR" sz="2000" dirty="0">
@@ -3796,11 +3827,11 @@
                   <a:srgbClr val="FF0000"/>
                 </a:solidFill>
               </a:rPr>
-              <a:t>choix d’autres participants </a:t>
+              <a:t>votre prudence</a:t>
             </a:r>
             <a:r>
               <a:rPr lang="fr-FR" sz="2000" dirty="0"/>
-              <a:t>ayant participé au même jeu d´argent avant vous. </a:t>
+              <a:t>, c´est-à-dire votre tendance à prendre des risques.</a:t>
             </a:r>
           </a:p>
         </p:txBody>
@@ -3810,7 +3841,7 @@
           <p:cNvPr id="5" name="Rectangle 3">
             <a:extLst>
               <a:ext uri="{FF2B5EF4-FFF2-40B4-BE49-F238E27FC236}">
-                <a16:creationId xmlns:a16="http://schemas.microsoft.com/office/drawing/2014/main" id="{D1E306A8-AF16-F644-98D9-0F53FCDF400D}"/>
+                <a16:creationId xmlns:a16="http://schemas.microsoft.com/office/drawing/2014/main" id="{451BE0B6-F3DD-BC45-A6CC-3E722B5C2A43}"/>
               </a:ext>
             </a:extLst>
           </p:cNvPr>
@@ -3819,7 +3850,7 @@
         </p:nvSpPr>
         <p:spPr>
           <a:xfrm>
-            <a:off x="3551393" y="6183144"/>
+            <a:off x="4100032" y="6087380"/>
             <a:ext cx="5089214" cy="400110"/>
           </a:xfrm>
           <a:prstGeom prst="rect">
@@ -3872,7 +3903,7 @@
     </p:spTree>
     <p:extLst>
       <p:ext uri="{BB962C8B-B14F-4D97-AF65-F5344CB8AC3E}">
-        <p14:creationId xmlns:p14="http://schemas.microsoft.com/office/powerpoint/2010/main" val="1246639158"/>
+        <p14:creationId xmlns:p14="http://schemas.microsoft.com/office/powerpoint/2010/main" val="255671310"/>
       </p:ext>
     </p:extLst>
   </p:cSld>
@@ -3924,7 +3955,7 @@
             <a:pPr algn="ctr"/>
             <a:r>
               <a:rPr lang="fr-FR" dirty="0"/>
-              <a:t>Jeu des Ecosystèmes</a:t>
+              <a:t>Phase de Prédiction</a:t>
             </a:r>
           </a:p>
         </p:txBody>
@@ -3959,7 +3990,7 @@
             <a:pPr algn="ctr"/>
             <a:r>
               <a:rPr lang="fr-FR" sz="2000" dirty="0"/>
-              <a:t>Nous évaluerons votre capacité à </a:t>
+              <a:t>Nous évaluerons votre capacité à prédire les </a:t>
             </a:r>
             <a:r>
               <a:rPr lang="fr-FR" sz="2000" dirty="0">
@@ -3967,13 +3998,12 @@
                   <a:srgbClr val="FF0000"/>
                 </a:solidFill>
               </a:rPr>
-              <a:t>apprendre et comprendre, en présence d'incertitude, une règle cachée </a:t>
+              <a:t>choix d’autres participants </a:t>
             </a:r>
             <a:r>
               <a:rPr lang="fr-FR" sz="2000" dirty="0"/>
-              <a:t>qui permet d'établir une prévision fiable.</a:t>
-            </a:r>
-            <a:endParaRPr lang="es-FR" sz="2000" dirty="0"/>
+              <a:t>ayant participé au même jeu d´argent avant vous. </a:t>
+            </a:r>
           </a:p>
         </p:txBody>
       </p:sp>
@@ -4044,7 +4074,7 @@
     </p:spTree>
     <p:extLst>
       <p:ext uri="{BB962C8B-B14F-4D97-AF65-F5344CB8AC3E}">
-        <p14:creationId xmlns:p14="http://schemas.microsoft.com/office/powerpoint/2010/main" val="61276001"/>
+        <p14:creationId xmlns:p14="http://schemas.microsoft.com/office/powerpoint/2010/main" val="1246639158"/>
       </p:ext>
     </p:extLst>
   </p:cSld>
@@ -4073,18 +4103,18 @@
       </p:grpSpPr>
       <p:sp>
         <p:nvSpPr>
-          <p:cNvPr id="3" name="Espace réservé du contenu 2"/>
-          <p:cNvSpPr>
-            <a:spLocks noGrp="1"/>
-          </p:cNvSpPr>
-          <p:nvPr>
-            <p:ph idx="1"/>
-          </p:nvPr>
-        </p:nvSpPr>
-        <p:spPr>
-          <a:xfrm>
-            <a:off x="838200" y="1072896"/>
-            <a:ext cx="10515600" cy="4513257"/>
+          <p:cNvPr id="2" name="Titre 1"/>
+          <p:cNvSpPr>
+            <a:spLocks noGrp="1"/>
+          </p:cNvSpPr>
+          <p:nvPr>
+            <p:ph type="title"/>
+          </p:nvPr>
+        </p:nvSpPr>
+        <p:spPr>
+          <a:xfrm>
+            <a:off x="2719162" y="1570148"/>
+            <a:ext cx="7009707" cy="2129977"/>
           </a:xfrm>
         </p:spPr>
         <p:txBody>
@@ -4093,99 +4123,20 @@
           </a:bodyPr>
           <a:lstStyle/>
           <a:p>
-            <a:pPr marL="0" indent="0" algn="just">
-              <a:buNone/>
-            </a:pPr>
-            <a:r>
-              <a:rPr lang="fr-FR" sz="2000" dirty="0"/>
-              <a:t>Nous allons vous demander de comparer des écosystèmes virtuels, composés de plantes dont la croissance naturelle est variable. En particulier, les écosystèmes diffèrent par:</a:t>
-            </a:r>
-          </a:p>
-          <a:p>
-            <a:pPr algn="just">
-              <a:buFontTx/>
-              <a:buChar char="-"/>
-            </a:pPr>
-            <a:r>
-              <a:rPr lang="fr-FR" sz="2000" dirty="0"/>
-              <a:t>La </a:t>
-            </a:r>
-            <a:r>
-              <a:rPr lang="fr-FR" sz="2000" dirty="0">
-                <a:solidFill>
-                  <a:srgbClr val="FF0000"/>
-                </a:solidFill>
-              </a:rPr>
-              <a:t>fertilité des plantes </a:t>
-            </a:r>
-            <a:r>
-              <a:rPr lang="fr-FR" sz="2000" dirty="0"/>
-              <a:t>(certaines peuvent être incapables de se reproduire) </a:t>
-            </a:r>
-          </a:p>
-          <a:p>
-            <a:pPr algn="just">
-              <a:buFontTx/>
-              <a:buChar char="-"/>
-            </a:pPr>
-            <a:r>
-              <a:rPr lang="fr-FR" sz="2000" dirty="0"/>
-              <a:t>Le </a:t>
-            </a:r>
-            <a:r>
-              <a:rPr lang="fr-FR" sz="2000" dirty="0">
-                <a:solidFill>
-                  <a:srgbClr val="FF0000"/>
-                </a:solidFill>
-              </a:rPr>
-              <a:t>taux de plantes en contact avec des prédateurs </a:t>
-            </a:r>
-            <a:r>
-              <a:rPr lang="fr-FR" sz="2000" dirty="0"/>
-              <a:t>(p. ex. : des herbivores comme des insectes). </a:t>
-            </a:r>
-          </a:p>
-          <a:p>
-            <a:pPr marL="0" indent="0" algn="just">
-              <a:buNone/>
-            </a:pPr>
-            <a:endParaRPr lang="fr-FR" sz="2000" dirty="0"/>
-          </a:p>
-          <a:p>
-            <a:pPr marL="0" indent="0" algn="just">
-              <a:buNone/>
-            </a:pPr>
-            <a:r>
-              <a:rPr lang="fr-FR" sz="2000" dirty="0"/>
-              <a:t>Vous devrez essayer de deviner lequel des deux écosystèmes aura donné le plus de plantes au bout d'un an. </a:t>
-            </a:r>
-          </a:p>
-          <a:p>
-            <a:pPr marL="0" indent="0" algn="just">
-              <a:buNone/>
-            </a:pPr>
-            <a:r>
-              <a:rPr lang="fr-FR" sz="2000" dirty="0"/>
-              <a:t>Après chacune de vos prévisions, nous vous donnerons la bonne réponse. Cela vous permettra d'améliorer progressivement votre compréhension du problème. </a:t>
-            </a:r>
-          </a:p>
-          <a:p>
-            <a:pPr marL="0" indent="0" algn="just">
-              <a:buNone/>
-            </a:pPr>
-            <a:r>
-              <a:rPr lang="fr-FR" sz="2000" dirty="0"/>
-              <a:t>Ici, nous évaluons votre capacité à apprendre et comprendre, en présence d'incertitude, une règle cachée qui permet d'établir une prévision fiable. </a:t>
-            </a:r>
-          </a:p>
-        </p:txBody>
-      </p:sp>
-      <p:sp>
-        <p:nvSpPr>
-          <p:cNvPr id="5" name="Rectángulo 4">
+            <a:pPr algn="ctr"/>
+            <a:r>
+              <a:rPr lang="fr-FR" dirty="0"/>
+              <a:t>Jeu des Ecosystèmes</a:t>
+            </a:r>
+          </a:p>
+        </p:txBody>
+      </p:sp>
+      <p:sp>
+        <p:nvSpPr>
+          <p:cNvPr id="3" name="Rectángulo 2">
             <a:extLst>
               <a:ext uri="{FF2B5EF4-FFF2-40B4-BE49-F238E27FC236}">
-                <a16:creationId xmlns:a16="http://schemas.microsoft.com/office/drawing/2014/main" id="{7341A93F-6626-504F-B534-D779E9399A22}"/>
+                <a16:creationId xmlns:a16="http://schemas.microsoft.com/office/drawing/2014/main" id="{EA7F033E-7ED6-294E-93DA-0440AE30B9E1}"/>
               </a:ext>
             </a:extLst>
           </p:cNvPr>
@@ -4194,56 +4145,46 @@
         </p:nvSpPr>
         <p:spPr>
           <a:xfrm>
-            <a:off x="602559" y="432773"/>
-            <a:ext cx="2066591" cy="577850"/>
+            <a:off x="1975104" y="3522703"/>
+            <a:ext cx="8497824" cy="707886"/>
           </a:xfrm>
           <a:prstGeom prst="rect">
             <a:avLst/>
           </a:prstGeom>
         </p:spPr>
         <p:txBody>
-          <a:bodyPr wrap="none">
+          <a:bodyPr wrap="square">
             <a:spAutoFit/>
           </a:bodyPr>
           <a:lstStyle/>
           <a:p>
-            <a:pPr algn="just">
-              <a:lnSpc>
-                <a:spcPct val="150000"/>
-              </a:lnSpc>
-              <a:spcBef>
-                <a:spcPts val="200"/>
-              </a:spcBef>
-              <a:spcAft>
-                <a:spcPts val="0"/>
-              </a:spcAft>
-            </a:pPr>
-            <a:r>
-              <a:rPr lang="fr-FR" sz="2400" b="1" dirty="0">
-                <a:solidFill>
-                  <a:srgbClr val="2E74B5"/>
-                </a:solidFill>
-                <a:latin typeface="Arial" panose="020B0604020202020204" pitchFamily="34" charset="0"/>
-                <a:cs typeface="Times New Roman" panose="02020603050405020304" pitchFamily="18" charset="0"/>
-              </a:rPr>
-              <a:t>Déroulement</a:t>
-            </a:r>
-            <a:endParaRPr lang="es-FR" b="1" dirty="0">
-              <a:solidFill>
-                <a:srgbClr val="2E74B5"/>
-              </a:solidFill>
-              <a:latin typeface="Arial" panose="020B0604020202020204" pitchFamily="34" charset="0"/>
-              <a:cs typeface="Times New Roman" panose="02020603050405020304" pitchFamily="18" charset="0"/>
-            </a:endParaRPr>
-          </a:p>
-        </p:txBody>
-      </p:sp>
-      <p:sp>
-        <p:nvSpPr>
-          <p:cNvPr id="6" name="Rectangle 3">
+            <a:pPr algn="ctr"/>
+            <a:r>
+              <a:rPr lang="fr-FR" sz="2000" dirty="0"/>
+              <a:t>Nous évaluerons votre capacité à </a:t>
+            </a:r>
+            <a:r>
+              <a:rPr lang="fr-FR" sz="2000" dirty="0">
+                <a:solidFill>
+                  <a:srgbClr val="FF0000"/>
+                </a:solidFill>
+              </a:rPr>
+              <a:t>apprendre et comprendre, en présence d'incertitude, une règle cachée </a:t>
+            </a:r>
+            <a:r>
+              <a:rPr lang="fr-FR" sz="2000" dirty="0"/>
+              <a:t>qui permet d'établir une prévision fiable.</a:t>
+            </a:r>
+            <a:endParaRPr lang="es-FR" sz="2000" dirty="0"/>
+          </a:p>
+        </p:txBody>
+      </p:sp>
+      <p:sp>
+        <p:nvSpPr>
+          <p:cNvPr id="5" name="Rectangle 3">
             <a:extLst>
               <a:ext uri="{FF2B5EF4-FFF2-40B4-BE49-F238E27FC236}">
-                <a16:creationId xmlns:a16="http://schemas.microsoft.com/office/drawing/2014/main" id="{950F77F6-D801-2A40-9828-736711F41D08}"/>
+                <a16:creationId xmlns:a16="http://schemas.microsoft.com/office/drawing/2014/main" id="{D1E306A8-AF16-F644-98D9-0F53FCDF400D}"/>
               </a:ext>
             </a:extLst>
           </p:cNvPr>
@@ -4252,8 +4193,8 @@
         </p:nvSpPr>
         <p:spPr>
           <a:xfrm>
-            <a:off x="905636" y="6025117"/>
-            <a:ext cx="10380727" cy="400110"/>
+            <a:off x="3551393" y="6183144"/>
+            <a:ext cx="5089214" cy="400110"/>
           </a:xfrm>
           <a:prstGeom prst="rect">
             <a:avLst/>
@@ -4297,35 +4238,15 @@
                   </a:schemeClr>
                 </a:solidFill>
               </a:rPr>
-              <a:t>] pour continuer ou sur la flèche gauche [</a:t>
-            </a:r>
-            <a:r>
-              <a:rPr lang="fr-FR" sz="2000" i="1" dirty="0">
-                <a:solidFill>
-                  <a:schemeClr val="tx1">
-                    <a:lumMod val="50000"/>
-                    <a:lumOff val="50000"/>
-                  </a:schemeClr>
-                </a:solidFill>
-                <a:sym typeface="Wingdings" pitchFamily="2" charset="2"/>
-              </a:rPr>
-              <a:t>] pour revenir en arrière</a:t>
-            </a:r>
-            <a:endParaRPr lang="fr-FR" sz="2000" i="1" dirty="0">
-              <a:solidFill>
-                <a:schemeClr val="tx1">
-                  <a:lumMod val="50000"/>
-                  <a:lumOff val="50000"/>
-                </a:schemeClr>
-              </a:solidFill>
-            </a:endParaRPr>
+              <a:t>] pour continuer</a:t>
+            </a:r>
           </a:p>
         </p:txBody>
       </p:sp>
     </p:spTree>
     <p:extLst>
       <p:ext uri="{BB962C8B-B14F-4D97-AF65-F5344CB8AC3E}">
-        <p14:creationId xmlns:p14="http://schemas.microsoft.com/office/powerpoint/2010/main" val="197218460"/>
+        <p14:creationId xmlns:p14="http://schemas.microsoft.com/office/powerpoint/2010/main" val="61276001"/>
       </p:ext>
     </p:extLst>
   </p:cSld>
@@ -4364,8 +4285,8 @@
         </p:nvSpPr>
         <p:spPr>
           <a:xfrm>
-            <a:off x="648245" y="716347"/>
-            <a:ext cx="10705555" cy="5653572"/>
+            <a:off x="838200" y="1072896"/>
+            <a:ext cx="10515600" cy="4513257"/>
           </a:xfrm>
         </p:spPr>
         <p:txBody>
@@ -4378,94 +4299,67 @@
               <a:buNone/>
             </a:pPr>
             <a:r>
-              <a:rPr lang="fr-FR" sz="1800" dirty="0"/>
-              <a:t>Cette tache se compose de </a:t>
-            </a:r>
-            <a:r>
-              <a:rPr lang="fr-FR" sz="1800" dirty="0">
+              <a:rPr lang="fr-FR" sz="2000" dirty="0"/>
+              <a:t>Nous allons vous demander de comparer des écosystèmes virtuels, composés de plantes dont la croissance naturelle est variable. En particulier, les écosystèmes diffèrent par:</a:t>
+            </a:r>
+          </a:p>
+          <a:p>
+            <a:pPr algn="just">
+              <a:buFontTx/>
+              <a:buChar char="-"/>
+            </a:pPr>
+            <a:r>
+              <a:rPr lang="fr-FR" sz="2000" dirty="0"/>
+              <a:t>La </a:t>
+            </a:r>
+            <a:r>
+              <a:rPr lang="fr-FR" sz="2000" dirty="0">
                 <a:solidFill>
                   <a:srgbClr val="FF0000"/>
                 </a:solidFill>
               </a:rPr>
-              <a:t>34 essais</a:t>
-            </a:r>
-            <a:r>
-              <a:rPr lang="fr-FR" sz="1800" dirty="0"/>
-              <a:t>. A chaque essai, nous vous présentons deux écosystèmes, dont chacun commence l'année avec 80 plantes. Vous devrez deviner lequel de ces deux écosystèmes contiendra le plus de plantes au bout d'un an, en prenant compte des aspects suivants:</a:t>
-            </a:r>
-          </a:p>
-          <a:p>
-            <a:r>
-              <a:rPr lang="fr-FR" sz="1800" dirty="0"/>
-              <a:t> </a:t>
-            </a:r>
-            <a:r>
-              <a:rPr lang="fr-FR" sz="1800" dirty="0">
+              <a:t>fertilité des plantes </a:t>
+            </a:r>
+            <a:r>
+              <a:rPr lang="fr-FR" sz="2000" dirty="0"/>
+              <a:t>(certaines peuvent être incapables de se reproduire) </a:t>
+            </a:r>
+          </a:p>
+          <a:p>
+            <a:pPr algn="just">
+              <a:buFontTx/>
+              <a:buChar char="-"/>
+            </a:pPr>
+            <a:r>
+              <a:rPr lang="fr-FR" sz="2000" dirty="0"/>
+              <a:t>Le </a:t>
+            </a:r>
+            <a:r>
+              <a:rPr lang="fr-FR" sz="2000" dirty="0">
                 <a:solidFill>
                   <a:srgbClr val="FF0000"/>
                 </a:solidFill>
               </a:rPr>
-              <a:t>Succès de la reproduction</a:t>
-            </a:r>
-            <a:r>
-              <a:rPr lang="fr-FR" sz="1800" dirty="0"/>
-              <a:t>.  Plus les plantes réussissent à se reproduire, plus la quantité de plantes sera importante à la fin de l'année. Bien que le taux de reproduction des plantes soit inconnu a priori, vous saurez combien de ces plantes sont fertiles. </a:t>
-            </a:r>
-            <a:endParaRPr lang="es-FR" sz="1800" dirty="0"/>
-          </a:p>
-          <a:p>
-            <a:r>
-              <a:rPr lang="fr-FR" sz="1800" dirty="0"/>
-              <a:t> </a:t>
-            </a:r>
-            <a:r>
-              <a:rPr lang="fr-FR" sz="1800" dirty="0">
-                <a:solidFill>
-                  <a:srgbClr val="FF0000"/>
-                </a:solidFill>
-              </a:rPr>
-              <a:t>Fréquence du contact avec des prédateurs</a:t>
-            </a:r>
-            <a:r>
-              <a:rPr lang="fr-FR" sz="1800" dirty="0"/>
-              <a:t>. Plus les plantes sont en contact avec des prédateurs, moins la quantité de plantes sera importante à la fin de l'année. Bien que l'agressivité des prédateurs soit inconnu a priori, vous connaitrez la proportion P de plantes qui sont effectivement en contact avec le prédateur. Celle-ci sera représentée par la portion rouge d´un diagramme en camembert (voir la figure plus bas). Réciproquement, la portion verte du camembert représentera la proportion de plantes qui ne sont pas en contact avec les prédateurs.</a:t>
-            </a:r>
-          </a:p>
-          <a:p>
-            <a:pPr marL="0" indent="0">
-              <a:buNone/>
-            </a:pPr>
-            <a:endParaRPr lang="fr-FR" sz="1800" dirty="0"/>
-          </a:p>
-          <a:p>
-            <a:pPr marL="0" indent="0">
-              <a:buNone/>
-            </a:pPr>
-            <a:r>
-              <a:rPr lang="fr-FR" sz="1800" dirty="0">
-                <a:solidFill>
-                  <a:srgbClr val="FF0000"/>
-                </a:solidFill>
-              </a:rPr>
-              <a:t>                                        </a:t>
+              <a:t>taux de plantes en contact avec des prédateurs </a:t>
+            </a:r>
+            <a:r>
+              <a:rPr lang="fr-FR" sz="2000" dirty="0"/>
+              <a:t>(p. ex. : des herbivores comme des insectes). </a:t>
             </a:r>
           </a:p>
           <a:p>
             <a:pPr marL="0" indent="0" algn="just">
               <a:buNone/>
             </a:pPr>
-            <a:r>
-              <a:rPr lang="fr-FR" sz="1800" dirty="0"/>
-              <a:t>                                           </a:t>
-            </a:r>
+            <a:endParaRPr lang="fr-FR" sz="2000" dirty="0"/>
           </a:p>
           <a:p>
             <a:pPr marL="0" indent="0" algn="just">
               <a:buNone/>
             </a:pPr>
             <a:r>
-              <a:rPr lang="fr-FR" sz="1800" dirty="0"/>
-              <a:t>                           Aucun contact avec des herbivores</a:t>
+              <a:rPr lang="fr-FR" sz="2000" dirty="0"/>
+              <a:t>Vous devrez essayer de deviner lequel des deux écosystèmes aura donné le plus de plantes au bout d'un an. </a:t>
             </a:r>
           </a:p>
           <a:p>
@@ -4473,15 +4367,18 @@
               <a:buNone/>
             </a:pPr>
             <a:r>
-              <a:rPr lang="fr-FR" sz="1800" dirty="0"/>
-              <a:t>                            </a:t>
+              <a:rPr lang="fr-FR" sz="2000" dirty="0"/>
+              <a:t>Après chacune de vos prévisions, nous vous donnerons la bonne réponse. Cela vous permettra d'améliorer progressivement votre compréhension du problème. </a:t>
             </a:r>
           </a:p>
           <a:p>
             <a:pPr marL="0" indent="0" algn="just">
               <a:buNone/>
             </a:pPr>
-            <a:endParaRPr lang="fr-FR" sz="1800" dirty="0"/>
+            <a:r>
+              <a:rPr lang="fr-FR" sz="2000" dirty="0"/>
+              <a:t>Ici, nous évaluons votre capacité à apprendre et comprendre, en présence d'incertitude, une règle cachée qui permet d'établir une prévision fiable. </a:t>
+            </a:r>
           </a:p>
         </p:txBody>
       </p:sp>
@@ -4499,8 +4396,8 @@
         </p:nvSpPr>
         <p:spPr>
           <a:xfrm>
-            <a:off x="648245" y="237429"/>
-            <a:ext cx="1752403" cy="496996"/>
+            <a:off x="602559" y="432773"/>
+            <a:ext cx="2066591" cy="577850"/>
           </a:xfrm>
           <a:prstGeom prst="rect">
             <a:avLst/>
@@ -4524,7 +4421,7 @@
               </a:spcAft>
             </a:pPr>
             <a:r>
-              <a:rPr lang="fr-FR" sz="2000" b="1" dirty="0">
+              <a:rPr lang="fr-FR" sz="2400" b="1" dirty="0">
                 <a:solidFill>
                   <a:srgbClr val="2E74B5"/>
                 </a:solidFill>
@@ -4533,6 +4430,13 @@
               </a:rPr>
               <a:t>Déroulement</a:t>
             </a:r>
+            <a:endParaRPr lang="es-FR" b="1" dirty="0">
+              <a:solidFill>
+                <a:srgbClr val="2E74B5"/>
+              </a:solidFill>
+              <a:latin typeface="Arial" panose="020B0604020202020204" pitchFamily="34" charset="0"/>
+              <a:cs typeface="Times New Roman" panose="02020603050405020304" pitchFamily="18" charset="0"/>
+            </a:endParaRPr>
           </a:p>
         </p:txBody>
       </p:sp>
@@ -4541,7 +4445,7 @@
           <p:cNvPr id="6" name="Rectangle 3">
             <a:extLst>
               <a:ext uri="{FF2B5EF4-FFF2-40B4-BE49-F238E27FC236}">
-                <a16:creationId xmlns:a16="http://schemas.microsoft.com/office/drawing/2014/main" id="{4B90CD4B-3742-F444-BED2-24C4FA254327}"/>
+                <a16:creationId xmlns:a16="http://schemas.microsoft.com/office/drawing/2014/main" id="{950F77F6-D801-2A40-9828-736711F41D08}"/>
               </a:ext>
             </a:extLst>
           </p:cNvPr>
@@ -4550,7 +4454,7 @@
         </p:nvSpPr>
         <p:spPr>
           <a:xfrm>
-            <a:off x="905636" y="6275982"/>
+            <a:off x="905636" y="6025117"/>
             <a:ext cx="10380727" cy="400110"/>
           </a:xfrm>
           <a:prstGeom prst="rect">
@@ -4620,144 +4524,10 @@
           </a:p>
         </p:txBody>
       </p:sp>
-      <p:sp>
-        <p:nvSpPr>
-          <p:cNvPr id="2" name="CuadroTexto 1">
-            <a:extLst>
-              <a:ext uri="{FF2B5EF4-FFF2-40B4-BE49-F238E27FC236}">
-                <a16:creationId xmlns:a16="http://schemas.microsoft.com/office/drawing/2014/main" id="{84F0600F-7E63-A04A-B978-D862BB883491}"/>
-              </a:ext>
-            </a:extLst>
-          </p:cNvPr>
-          <p:cNvSpPr txBox="1"/>
-          <p:nvPr/>
-        </p:nvSpPr>
-        <p:spPr>
-          <a:xfrm>
-            <a:off x="2400648" y="3719478"/>
-            <a:ext cx="7653493" cy="1477328"/>
-          </a:xfrm>
-          <a:prstGeom prst="rect">
-            <a:avLst/>
-          </a:prstGeom>
-          <a:noFill/>
-        </p:spPr>
-        <p:txBody>
-          <a:bodyPr wrap="square" rtlCol="0">
-            <a:spAutoFit/>
-          </a:bodyPr>
-          <a:lstStyle/>
-          <a:p>
-            <a:pPr algn="just"/>
-            <a:endParaRPr lang="fr-FR" dirty="0"/>
-          </a:p>
-          <a:p>
-            <a:pPr algn="just"/>
-            <a:endParaRPr lang="fr-FR" dirty="0"/>
-          </a:p>
-          <a:p>
-            <a:pPr algn="just"/>
-            <a:r>
-              <a:rPr lang="fr-FR" dirty="0"/>
-              <a:t>60 plantes sont fertiles                                           Toutes les plantes sont fertiles</a:t>
-            </a:r>
-          </a:p>
-          <a:p>
-            <a:pPr algn="just"/>
-            <a:endParaRPr lang="fr-FR" dirty="0"/>
-          </a:p>
-          <a:p>
-            <a:r>
-              <a:rPr lang="en-GB" dirty="0"/>
-              <a:t>                                                                   vs.</a:t>
-            </a:r>
-          </a:p>
-        </p:txBody>
-      </p:sp>
-      <p:pic>
-        <p:nvPicPr>
-          <p:cNvPr id="7" name="Imagen 6" descr="Imagen que contiene fruta, competencia de atletismo, cd&#10;&#10;Descripción generada automáticamente">
-            <a:extLst>
-              <a:ext uri="{FF2B5EF4-FFF2-40B4-BE49-F238E27FC236}">
-                <a16:creationId xmlns:a16="http://schemas.microsoft.com/office/drawing/2014/main" id="{CE7E1695-9971-E044-97C4-78170A2BFA48}"/>
-              </a:ext>
-            </a:extLst>
-          </p:cNvPr>
-          <p:cNvPicPr>
-            <a:picLocks noChangeAspect="1"/>
-          </p:cNvPicPr>
-          <p:nvPr/>
-        </p:nvPicPr>
-        <p:blipFill rotWithShape="1">
-          <a:blip r:embed="rId2">
-            <a:extLst>
-              <a:ext uri="{28A0092B-C50C-407E-A947-70E740481C1C}">
-                <a14:useLocalDpi xmlns:a14="http://schemas.microsoft.com/office/drawing/2010/main" val="0"/>
-              </a:ext>
-            </a:extLst>
-          </a:blip>
-          <a:srcRect l="16420" t="18963" r="14673" b="15062"/>
-          <a:stretch/>
-        </p:blipFill>
-        <p:spPr>
-          <a:xfrm>
-            <a:off x="7700120" y="4550917"/>
-            <a:ext cx="1591734" cy="1524000"/>
-          </a:xfrm>
-          <a:prstGeom prst="rect">
-            <a:avLst/>
-          </a:prstGeom>
-        </p:spPr>
-      </p:pic>
-      <p:sp>
-        <p:nvSpPr>
-          <p:cNvPr id="10" name="Rectángulo 9">
-            <a:extLst>
-              <a:ext uri="{FF2B5EF4-FFF2-40B4-BE49-F238E27FC236}">
-                <a16:creationId xmlns:a16="http://schemas.microsoft.com/office/drawing/2014/main" id="{DF90F87B-C33D-E549-9349-87E099859D8A}"/>
-              </a:ext>
-            </a:extLst>
-          </p:cNvPr>
-          <p:cNvSpPr/>
-          <p:nvPr/>
-        </p:nvSpPr>
-        <p:spPr>
-          <a:xfrm>
-            <a:off x="1928553" y="4126415"/>
-            <a:ext cx="8125588" cy="1964016"/>
-          </a:xfrm>
-          <a:prstGeom prst="rect">
-            <a:avLst/>
-          </a:prstGeom>
-          <a:noFill/>
-        </p:spPr>
-        <p:style>
-          <a:lnRef idx="2">
-            <a:schemeClr val="dk1"/>
-          </a:lnRef>
-          <a:fillRef idx="1">
-            <a:schemeClr val="lt1"/>
-          </a:fillRef>
-          <a:effectRef idx="0">
-            <a:schemeClr val="dk1"/>
-          </a:effectRef>
-          <a:fontRef idx="minor">
-            <a:schemeClr val="dk1"/>
-          </a:fontRef>
-        </p:style>
-        <p:txBody>
-          <a:bodyPr rtlCol="0" anchor="ctr"/>
-          <a:lstStyle/>
-          <a:p>
-            <a:pPr algn="ctr"/>
-            <a:endParaRPr lang="en-GB"/>
-          </a:p>
-        </p:txBody>
-      </p:sp>
     </p:spTree>
     <p:extLst>
       <p:ext uri="{BB962C8B-B14F-4D97-AF65-F5344CB8AC3E}">
-        <p14:creationId xmlns:p14="http://schemas.microsoft.com/office/powerpoint/2010/main" val="2948591915"/>
+        <p14:creationId xmlns:p14="http://schemas.microsoft.com/office/powerpoint/2010/main" val="197218460"/>
       </p:ext>
     </p:extLst>
   </p:cSld>
@@ -4796,6 +4566,438 @@
         </p:nvSpPr>
         <p:spPr>
           <a:xfrm>
+            <a:off x="648245" y="716347"/>
+            <a:ext cx="10705555" cy="5653572"/>
+          </a:xfrm>
+        </p:spPr>
+        <p:txBody>
+          <a:bodyPr>
+            <a:normAutofit/>
+          </a:bodyPr>
+          <a:lstStyle/>
+          <a:p>
+            <a:pPr marL="0" indent="0" algn="just">
+              <a:buNone/>
+            </a:pPr>
+            <a:r>
+              <a:rPr lang="fr-FR" sz="1800" dirty="0"/>
+              <a:t>Cette tache se compose de </a:t>
+            </a:r>
+            <a:r>
+              <a:rPr lang="fr-FR" sz="1800" dirty="0">
+                <a:solidFill>
+                  <a:srgbClr val="FF0000"/>
+                </a:solidFill>
+              </a:rPr>
+              <a:t>34 essais</a:t>
+            </a:r>
+            <a:r>
+              <a:rPr lang="fr-FR" sz="1800" dirty="0"/>
+              <a:t>. A chaque essai, nous vous présentons deux écosystèmes, dont chacun commence l'année avec 80 plantes. Vous devrez deviner lequel de ces deux écosystèmes contiendra le plus de plantes au bout d'un an, en prenant compte des aspects suivants:</a:t>
+            </a:r>
+          </a:p>
+          <a:p>
+            <a:r>
+              <a:rPr lang="fr-FR" sz="1800" dirty="0"/>
+              <a:t> </a:t>
+            </a:r>
+            <a:r>
+              <a:rPr lang="fr-FR" sz="1800" dirty="0">
+                <a:solidFill>
+                  <a:srgbClr val="FF0000"/>
+                </a:solidFill>
+              </a:rPr>
+              <a:t>Succès de la reproduction</a:t>
+            </a:r>
+            <a:r>
+              <a:rPr lang="fr-FR" sz="1800" dirty="0"/>
+              <a:t>.  Plus les plantes réussissent à se reproduire, plus la quantité de plantes sera importante à la fin de l'année. Bien que le taux de reproduction des plantes soit inconnu a priori, vous saurez combien de ces plantes sont fertiles. </a:t>
+            </a:r>
+            <a:endParaRPr lang="es-FR" sz="1800" dirty="0"/>
+          </a:p>
+          <a:p>
+            <a:r>
+              <a:rPr lang="fr-FR" sz="1800" dirty="0"/>
+              <a:t> </a:t>
+            </a:r>
+            <a:r>
+              <a:rPr lang="fr-FR" sz="1800" dirty="0">
+                <a:solidFill>
+                  <a:srgbClr val="FF0000"/>
+                </a:solidFill>
+              </a:rPr>
+              <a:t>Fréquence du contact avec des prédateurs</a:t>
+            </a:r>
+            <a:r>
+              <a:rPr lang="fr-FR" sz="1800" dirty="0"/>
+              <a:t>. Plus les plantes sont en contact avec des prédateurs, moins la quantité de plantes sera importante à la fin de l'année. Bien que l'agressivité des prédateurs soit inconnu a priori, vous connaitrez la proportion P de plantes qui sont effectivement en contact avec le prédateur. Celle-ci sera représentée par la portion rouge d´un diagramme en camembert (voir la figure plus bas). Réciproquement, la portion verte du camembert représentera la proportion de plantes qui ne sont pas en contact avec les prédateurs.</a:t>
+            </a:r>
+          </a:p>
+          <a:p>
+            <a:pPr marL="0" indent="0">
+              <a:buNone/>
+            </a:pPr>
+            <a:endParaRPr lang="fr-FR" sz="1800" dirty="0"/>
+          </a:p>
+          <a:p>
+            <a:pPr marL="0" indent="0">
+              <a:buNone/>
+            </a:pPr>
+            <a:r>
+              <a:rPr lang="fr-FR" sz="1800" dirty="0">
+                <a:solidFill>
+                  <a:srgbClr val="FF0000"/>
+                </a:solidFill>
+              </a:rPr>
+              <a:t>                                        </a:t>
+            </a:r>
+          </a:p>
+          <a:p>
+            <a:pPr marL="0" indent="0" algn="just">
+              <a:buNone/>
+            </a:pPr>
+            <a:r>
+              <a:rPr lang="fr-FR" sz="1800" dirty="0"/>
+              <a:t>                                           </a:t>
+            </a:r>
+          </a:p>
+          <a:p>
+            <a:pPr marL="0" indent="0" algn="just">
+              <a:buNone/>
+            </a:pPr>
+            <a:r>
+              <a:rPr lang="fr-FR" sz="1800" dirty="0"/>
+              <a:t>                           Aucun contact avec des herbivores</a:t>
+            </a:r>
+          </a:p>
+          <a:p>
+            <a:pPr marL="0" indent="0" algn="just">
+              <a:buNone/>
+            </a:pPr>
+            <a:r>
+              <a:rPr lang="fr-FR" sz="1800" dirty="0"/>
+              <a:t>                            </a:t>
+            </a:r>
+          </a:p>
+          <a:p>
+            <a:pPr marL="0" indent="0" algn="just">
+              <a:buNone/>
+            </a:pPr>
+            <a:endParaRPr lang="fr-FR" sz="1800" dirty="0"/>
+          </a:p>
+        </p:txBody>
+      </p:sp>
+      <p:sp>
+        <p:nvSpPr>
+          <p:cNvPr id="5" name="Rectángulo 4">
+            <a:extLst>
+              <a:ext uri="{FF2B5EF4-FFF2-40B4-BE49-F238E27FC236}">
+                <a16:creationId xmlns:a16="http://schemas.microsoft.com/office/drawing/2014/main" id="{7341A93F-6626-504F-B534-D779E9399A22}"/>
+              </a:ext>
+            </a:extLst>
+          </p:cNvPr>
+          <p:cNvSpPr/>
+          <p:nvPr/>
+        </p:nvSpPr>
+        <p:spPr>
+          <a:xfrm>
+            <a:off x="648245" y="237429"/>
+            <a:ext cx="1752403" cy="496996"/>
+          </a:xfrm>
+          <a:prstGeom prst="rect">
+            <a:avLst/>
+          </a:prstGeom>
+        </p:spPr>
+        <p:txBody>
+          <a:bodyPr wrap="none">
+            <a:spAutoFit/>
+          </a:bodyPr>
+          <a:lstStyle/>
+          <a:p>
+            <a:pPr algn="just">
+              <a:lnSpc>
+                <a:spcPct val="150000"/>
+              </a:lnSpc>
+              <a:spcBef>
+                <a:spcPts val="200"/>
+              </a:spcBef>
+              <a:spcAft>
+                <a:spcPts val="0"/>
+              </a:spcAft>
+            </a:pPr>
+            <a:r>
+              <a:rPr lang="fr-FR" sz="2000" b="1" dirty="0">
+                <a:solidFill>
+                  <a:srgbClr val="2E74B5"/>
+                </a:solidFill>
+                <a:latin typeface="Arial" panose="020B0604020202020204" pitchFamily="34" charset="0"/>
+                <a:cs typeface="Times New Roman" panose="02020603050405020304" pitchFamily="18" charset="0"/>
+              </a:rPr>
+              <a:t>Déroulement</a:t>
+            </a:r>
+          </a:p>
+        </p:txBody>
+      </p:sp>
+      <p:sp>
+        <p:nvSpPr>
+          <p:cNvPr id="6" name="Rectangle 3">
+            <a:extLst>
+              <a:ext uri="{FF2B5EF4-FFF2-40B4-BE49-F238E27FC236}">
+                <a16:creationId xmlns:a16="http://schemas.microsoft.com/office/drawing/2014/main" id="{4B90CD4B-3742-F444-BED2-24C4FA254327}"/>
+              </a:ext>
+            </a:extLst>
+          </p:cNvPr>
+          <p:cNvSpPr/>
+          <p:nvPr/>
+        </p:nvSpPr>
+        <p:spPr>
+          <a:xfrm>
+            <a:off x="905636" y="6275982"/>
+            <a:ext cx="10380727" cy="400110"/>
+          </a:xfrm>
+          <a:prstGeom prst="rect">
+            <a:avLst/>
+          </a:prstGeom>
+        </p:spPr>
+        <p:txBody>
+          <a:bodyPr wrap="none">
+            <a:spAutoFit/>
+          </a:bodyPr>
+          <a:lstStyle/>
+          <a:p>
+            <a:r>
+              <a:rPr lang="fr-FR" sz="2000" i="1" dirty="0">
+                <a:solidFill>
+                  <a:schemeClr val="tx1">
+                    <a:lumMod val="50000"/>
+                    <a:lumOff val="50000"/>
+                  </a:schemeClr>
+                </a:solidFill>
+              </a:rPr>
+              <a:t>Appuyez sur la flèche droite [</a:t>
+            </a:r>
+            <a:r>
+              <a:rPr lang="fr-FR" sz="2000" i="1" dirty="0">
+                <a:solidFill>
+                  <a:schemeClr val="tx1">
+                    <a:lumMod val="50000"/>
+                    <a:lumOff val="50000"/>
+                  </a:schemeClr>
+                </a:solidFill>
+                <a:sym typeface="Wingdings" pitchFamily="2" charset="2"/>
+              </a:rPr>
+              <a:t></a:t>
+            </a:r>
+            <a:r>
+              <a:rPr lang="fr-FR" sz="2000" i="1" dirty="0">
+                <a:solidFill>
+                  <a:schemeClr val="tx1">
+                    <a:lumMod val="50000"/>
+                    <a:lumOff val="50000"/>
+                  </a:schemeClr>
+                </a:solidFill>
+              </a:rPr>
+              <a:t>] pour continuer ou sur la flèche gauche [</a:t>
+            </a:r>
+            <a:r>
+              <a:rPr lang="fr-FR" sz="2000" i="1" dirty="0">
+                <a:solidFill>
+                  <a:schemeClr val="tx1">
+                    <a:lumMod val="50000"/>
+                    <a:lumOff val="50000"/>
+                  </a:schemeClr>
+                </a:solidFill>
+                <a:sym typeface="Wingdings" pitchFamily="2" charset="2"/>
+              </a:rPr>
+              <a:t>] pour revenir en arrière</a:t>
+            </a:r>
+            <a:endParaRPr lang="fr-FR" sz="2000" i="1" dirty="0">
+              <a:solidFill>
+                <a:schemeClr val="tx1">
+                  <a:lumMod val="50000"/>
+                  <a:lumOff val="50000"/>
+                </a:schemeClr>
+              </a:solidFill>
+            </a:endParaRPr>
+          </a:p>
+        </p:txBody>
+      </p:sp>
+      <p:sp>
+        <p:nvSpPr>
+          <p:cNvPr id="2" name="CuadroTexto 1">
+            <a:extLst>
+              <a:ext uri="{FF2B5EF4-FFF2-40B4-BE49-F238E27FC236}">
+                <a16:creationId xmlns:a16="http://schemas.microsoft.com/office/drawing/2014/main" id="{84F0600F-7E63-A04A-B978-D862BB883491}"/>
+              </a:ext>
+            </a:extLst>
+          </p:cNvPr>
+          <p:cNvSpPr txBox="1"/>
+          <p:nvPr/>
+        </p:nvSpPr>
+        <p:spPr>
+          <a:xfrm>
+            <a:off x="2400648" y="3719478"/>
+            <a:ext cx="7653493" cy="1477328"/>
+          </a:xfrm>
+          <a:prstGeom prst="rect">
+            <a:avLst/>
+          </a:prstGeom>
+          <a:noFill/>
+        </p:spPr>
+        <p:txBody>
+          <a:bodyPr wrap="square" rtlCol="0">
+            <a:spAutoFit/>
+          </a:bodyPr>
+          <a:lstStyle/>
+          <a:p>
+            <a:pPr algn="just"/>
+            <a:endParaRPr lang="fr-FR" dirty="0"/>
+          </a:p>
+          <a:p>
+            <a:pPr algn="just"/>
+            <a:endParaRPr lang="fr-FR" dirty="0"/>
+          </a:p>
+          <a:p>
+            <a:pPr algn="just"/>
+            <a:r>
+              <a:rPr lang="fr-FR" dirty="0"/>
+              <a:t>60 plantes sont fertiles                                           Toutes les plantes sont fertiles</a:t>
+            </a:r>
+          </a:p>
+          <a:p>
+            <a:pPr algn="just"/>
+            <a:endParaRPr lang="fr-FR" dirty="0"/>
+          </a:p>
+          <a:p>
+            <a:r>
+              <a:rPr lang="en-GB" dirty="0"/>
+              <a:t>                                                                   vs.</a:t>
+            </a:r>
+          </a:p>
+        </p:txBody>
+      </p:sp>
+      <p:pic>
+        <p:nvPicPr>
+          <p:cNvPr id="7" name="Imagen 6" descr="Imagen que contiene fruta, competencia de atletismo, cd&#10;&#10;Descripción generada automáticamente">
+            <a:extLst>
+              <a:ext uri="{FF2B5EF4-FFF2-40B4-BE49-F238E27FC236}">
+                <a16:creationId xmlns:a16="http://schemas.microsoft.com/office/drawing/2014/main" id="{CE7E1695-9971-E044-97C4-78170A2BFA48}"/>
+              </a:ext>
+            </a:extLst>
+          </p:cNvPr>
+          <p:cNvPicPr>
+            <a:picLocks noChangeAspect="1"/>
+          </p:cNvPicPr>
+          <p:nvPr/>
+        </p:nvPicPr>
+        <p:blipFill rotWithShape="1">
+          <a:blip r:embed="rId2">
+            <a:extLst>
+              <a:ext uri="{28A0092B-C50C-407E-A947-70E740481C1C}">
+                <a14:useLocalDpi xmlns:a14="http://schemas.microsoft.com/office/drawing/2010/main" val="0"/>
+              </a:ext>
+            </a:extLst>
+          </a:blip>
+          <a:srcRect l="16420" t="18963" r="14673" b="15062"/>
+          <a:stretch/>
+        </p:blipFill>
+        <p:spPr>
+          <a:xfrm>
+            <a:off x="7700120" y="4550917"/>
+            <a:ext cx="1591734" cy="1524000"/>
+          </a:xfrm>
+          <a:prstGeom prst="rect">
+            <a:avLst/>
+          </a:prstGeom>
+        </p:spPr>
+      </p:pic>
+      <p:sp>
+        <p:nvSpPr>
+          <p:cNvPr id="10" name="Rectángulo 9">
+            <a:extLst>
+              <a:ext uri="{FF2B5EF4-FFF2-40B4-BE49-F238E27FC236}">
+                <a16:creationId xmlns:a16="http://schemas.microsoft.com/office/drawing/2014/main" id="{DF90F87B-C33D-E549-9349-87E099859D8A}"/>
+              </a:ext>
+            </a:extLst>
+          </p:cNvPr>
+          <p:cNvSpPr/>
+          <p:nvPr/>
+        </p:nvSpPr>
+        <p:spPr>
+          <a:xfrm>
+            <a:off x="1928553" y="4126415"/>
+            <a:ext cx="8125588" cy="1964016"/>
+          </a:xfrm>
+          <a:prstGeom prst="rect">
+            <a:avLst/>
+          </a:prstGeom>
+          <a:noFill/>
+        </p:spPr>
+        <p:style>
+          <a:lnRef idx="2">
+            <a:schemeClr val="dk1"/>
+          </a:lnRef>
+          <a:fillRef idx="1">
+            <a:schemeClr val="lt1"/>
+          </a:fillRef>
+          <a:effectRef idx="0">
+            <a:schemeClr val="dk1"/>
+          </a:effectRef>
+          <a:fontRef idx="minor">
+            <a:schemeClr val="dk1"/>
+          </a:fontRef>
+        </p:style>
+        <p:txBody>
+          <a:bodyPr rtlCol="0" anchor="ctr"/>
+          <a:lstStyle/>
+          <a:p>
+            <a:pPr algn="ctr"/>
+            <a:endParaRPr lang="en-GB"/>
+          </a:p>
+        </p:txBody>
+      </p:sp>
+    </p:spTree>
+    <p:extLst>
+      <p:ext uri="{BB962C8B-B14F-4D97-AF65-F5344CB8AC3E}">
+        <p14:creationId xmlns:p14="http://schemas.microsoft.com/office/powerpoint/2010/main" val="2948591915"/>
+      </p:ext>
+    </p:extLst>
+  </p:cSld>
+  <p:clrMapOvr>
+    <a:masterClrMapping/>
+  </p:clrMapOvr>
+</p:sld>
+</file>
+
+<file path=ppt/slides/slide17.xml><?xml version="1.0" encoding="utf-8"?>
+<p:sld xmlns:a="http://schemas.openxmlformats.org/drawingml/2006/main" xmlns:r="http://schemas.openxmlformats.org/officeDocument/2006/relationships" xmlns:p="http://schemas.openxmlformats.org/presentationml/2006/main">
+  <p:cSld>
+    <p:spTree>
+      <p:nvGrpSpPr>
+        <p:cNvPr id="1" name=""/>
+        <p:cNvGrpSpPr/>
+        <p:nvPr/>
+      </p:nvGrpSpPr>
+      <p:grpSpPr>
+        <a:xfrm>
+          <a:off x="0" y="0"/>
+          <a:ext cx="0" cy="0"/>
+          <a:chOff x="0" y="0"/>
+          <a:chExt cx="0" cy="0"/>
+        </a:xfrm>
+      </p:grpSpPr>
+      <p:sp>
+        <p:nvSpPr>
+          <p:cNvPr id="3" name="Espace réservé du contenu 2"/>
+          <p:cNvSpPr>
+            <a:spLocks noGrp="1"/>
+          </p:cNvSpPr>
+          <p:nvPr>
+            <p:ph idx="1"/>
+          </p:nvPr>
+        </p:nvSpPr>
+        <p:spPr>
+          <a:xfrm>
             <a:off x="648245" y="916402"/>
             <a:ext cx="10705555" cy="5653572"/>
           </a:xfrm>
@@ -5084,7 +5286,7 @@
 </p:sld>
 </file>
 
-<file path=ppt/slides/slide17.xml><?xml version="1.0" encoding="utf-8"?>
+<file path=ppt/slides/slide18.xml><?xml version="1.0" encoding="utf-8"?>
 <p:sld xmlns:a="http://schemas.openxmlformats.org/drawingml/2006/main" xmlns:r="http://schemas.openxmlformats.org/officeDocument/2006/relationships" xmlns:p="http://schemas.openxmlformats.org/presentationml/2006/main">
   <p:cSld>
     <p:spTree>
@@ -6905,7 +7107,7 @@
         </p:spPr>
         <p:txBody>
           <a:bodyPr>
-            <a:normAutofit lnSpcReduction="10000"/>
+            <a:normAutofit/>
           </a:bodyPr>
           <a:lstStyle/>
           <a:p>
@@ -6933,22 +7135,10 @@
             <a:pPr marL="0" indent="0" algn="just">
               <a:buNone/>
             </a:pPr>
-            <a:endParaRPr lang="fr-FR" sz="2000" dirty="0"/>
-          </a:p>
-          <a:p>
-            <a:pPr marL="0" indent="0" algn="just">
-              <a:buNone/>
-            </a:pPr>
             <a:r>
               <a:rPr lang="fr-FR" sz="2000" dirty="0"/>
-              <a:t>Pour répondre, vous déplacerez le pointeur de la barre de défilement avec la souris (voir figure prochaine). </a:t>
-            </a:r>
-          </a:p>
-          <a:p>
-            <a:pPr marL="0" indent="0" algn="just">
-              <a:buNone/>
-            </a:pPr>
-            <a:endParaRPr lang="fr-FR" sz="2000" dirty="0"/>
+              <a:t>Pour répondre, vous déplacerez le pointeur de la barre de défilement avec la souris.</a:t>
+            </a:r>
           </a:p>
           <a:p>
             <a:pPr marL="0" indent="0" algn="just">
@@ -7082,7 +7272,7 @@
         </p:blipFill>
         <p:spPr>
           <a:xfrm>
-            <a:off x="939800" y="2739715"/>
+            <a:off x="889000" y="2376007"/>
             <a:ext cx="10414000" cy="2493879"/>
           </a:xfrm>
           <a:prstGeom prst="rect">
@@ -7216,8 +7406,8 @@
         </p:nvSpPr>
         <p:spPr>
           <a:xfrm>
-            <a:off x="838200" y="2167695"/>
-            <a:ext cx="10515600" cy="4690305"/>
+            <a:off x="648245" y="916402"/>
+            <a:ext cx="10705555" cy="5653572"/>
           </a:xfrm>
         </p:spPr>
         <p:txBody>
@@ -7226,97 +7416,82 @@
           </a:bodyPr>
           <a:lstStyle/>
           <a:p>
-            <a:pPr marL="0" indent="0" algn="ctr">
+            <a:pPr marL="0" indent="0" algn="just">
+              <a:buNone/>
+            </a:pPr>
+            <a:r>
+              <a:rPr lang="fr-FR" sz="2000" dirty="0"/>
+              <a:t>Finalement, à la fin de chaque test de prédiction, on vous demandera à quel point vous pensez que l’autre participant(e) est plus prudent(e) que la normale.  Pour répondre, vous devrez également l'indiquer en déplaçant le pointeur de la barre de défilement avec la souris (voir figure ci-dessous).</a:t>
+            </a:r>
+          </a:p>
+          <a:p>
+            <a:pPr marL="0" indent="0" algn="just">
+              <a:buNone/>
+            </a:pPr>
+            <a:r>
+              <a:rPr lang="fr-FR" sz="2000" dirty="0"/>
+              <a:t>Pour répondre, vous déplacerez le pointeur de la barre de défilement avec la souris. </a:t>
+            </a:r>
+          </a:p>
+          <a:p>
+            <a:pPr marL="0" indent="0" algn="just">
               <a:buNone/>
             </a:pPr>
             <a:endParaRPr lang="fr-FR" sz="2000" dirty="0"/>
           </a:p>
           <a:p>
-            <a:pPr marL="0" indent="0" algn="ctr">
+            <a:pPr marL="0" indent="0" algn="just">
+              <a:buNone/>
+            </a:pPr>
+            <a:endParaRPr lang="fr-FR" sz="2000" dirty="0"/>
+          </a:p>
+          <a:p>
+            <a:pPr marL="0" indent="0" algn="just">
+              <a:buNone/>
+            </a:pPr>
+            <a:endParaRPr lang="fr-FR" sz="2000" dirty="0"/>
+          </a:p>
+          <a:p>
+            <a:pPr marL="0" indent="0" algn="just">
+              <a:buNone/>
+            </a:pPr>
+            <a:endParaRPr lang="fr-FR" sz="2000" dirty="0"/>
+          </a:p>
+          <a:p>
+            <a:pPr marL="0" indent="0" algn="just">
+              <a:buNone/>
+            </a:pPr>
+            <a:endParaRPr lang="fr-FR" sz="2000" dirty="0"/>
+          </a:p>
+          <a:p>
+            <a:pPr marL="0" indent="0" algn="just">
+              <a:buNone/>
+            </a:pPr>
+            <a:endParaRPr lang="fr-FR" sz="2000" dirty="0"/>
+          </a:p>
+          <a:p>
+            <a:pPr marL="0" indent="0" algn="just">
+              <a:buNone/>
+            </a:pPr>
+            <a:endParaRPr lang="fr-FR" sz="2000" dirty="0"/>
+          </a:p>
+          <a:p>
+            <a:pPr marL="0" indent="0" algn="just">
               <a:buNone/>
             </a:pPr>
             <a:r>
               <a:rPr lang="fr-FR" sz="2000" dirty="0"/>
-              <a:t>Vous aurez maintenant l'occasion de vous familiariser la tâche pendant certains essais.</a:t>
-            </a:r>
-          </a:p>
-          <a:p>
-            <a:pPr marL="0" indent="0" algn="ctr">
-              <a:buNone/>
-            </a:pPr>
-            <a:endParaRPr lang="fr-FR" sz="2000" dirty="0"/>
-          </a:p>
-          <a:p>
-            <a:pPr marL="0" indent="0" algn="ctr">
-              <a:buNone/>
-            </a:pPr>
-            <a:endParaRPr lang="fr-FR" sz="2000" dirty="0"/>
-          </a:p>
-          <a:p>
-            <a:pPr marL="0" indent="0" algn="ctr">
-              <a:buNone/>
-            </a:pPr>
-            <a:r>
-              <a:rPr lang="fr-FR" sz="2000" dirty="0"/>
-              <a:t>Votre performance dans cette phase </a:t>
-            </a:r>
-            <a:r>
-              <a:rPr lang="fr-FR" sz="2000" dirty="0">
-                <a:solidFill>
-                  <a:srgbClr val="FF0000"/>
-                </a:solidFill>
-              </a:rPr>
-              <a:t>ne sera pas prise en compte </a:t>
-            </a:r>
-            <a:r>
-              <a:rPr lang="fr-FR" sz="2000" dirty="0"/>
-              <a:t>pour votre bonus financier. </a:t>
-            </a:r>
-          </a:p>
-        </p:txBody>
-      </p:sp>
-      <p:sp>
-        <p:nvSpPr>
-          <p:cNvPr id="7" name="Titre 1">
+              <a:t>Si vous ne déplacez pas la barre avant d'appuyer sur le bouton OK, vous ne pourrez pas passer au essai suivant.</a:t>
+            </a:r>
+          </a:p>
+        </p:txBody>
+      </p:sp>
+      <p:sp>
+        <p:nvSpPr>
+          <p:cNvPr id="5" name="Rectángulo 4">
             <a:extLst>
               <a:ext uri="{FF2B5EF4-FFF2-40B4-BE49-F238E27FC236}">
-                <a16:creationId xmlns:a16="http://schemas.microsoft.com/office/drawing/2014/main" id="{7636C7F2-D3B8-7D4C-9EBF-161B37C6DF05}"/>
-              </a:ext>
-            </a:extLst>
-          </p:cNvPr>
-          <p:cNvSpPr>
-            <a:spLocks noGrp="1"/>
-          </p:cNvSpPr>
-          <p:nvPr>
-            <p:ph type="title"/>
-          </p:nvPr>
-        </p:nvSpPr>
-        <p:spPr>
-          <a:xfrm>
-            <a:off x="2493611" y="681037"/>
-            <a:ext cx="7576981" cy="2129977"/>
-          </a:xfrm>
-        </p:spPr>
-        <p:txBody>
-          <a:bodyPr>
-            <a:normAutofit/>
-          </a:bodyPr>
-          <a:lstStyle/>
-          <a:p>
-            <a:pPr algn="ctr"/>
-            <a:r>
-              <a:rPr lang="fr-FR" dirty="0"/>
-              <a:t>Entrainement – Phase Décision</a:t>
-            </a:r>
-          </a:p>
-        </p:txBody>
-      </p:sp>
-      <p:sp>
-        <p:nvSpPr>
-          <p:cNvPr id="5" name="Rectangle 3">
-            <a:extLst>
-              <a:ext uri="{FF2B5EF4-FFF2-40B4-BE49-F238E27FC236}">
-                <a16:creationId xmlns:a16="http://schemas.microsoft.com/office/drawing/2014/main" id="{8D4A4AC5-717D-F343-BCBE-5E4E31179B80}"/>
+                <a16:creationId xmlns:a16="http://schemas.microsoft.com/office/drawing/2014/main" id="{7341A93F-6626-504F-B534-D779E9399A22}"/>
               </a:ext>
             </a:extLst>
           </p:cNvPr>
@@ -7325,8 +7500,59 @@
         </p:nvSpPr>
         <p:spPr>
           <a:xfrm>
-            <a:off x="3551393" y="6176963"/>
-            <a:ext cx="5089214" cy="400110"/>
+            <a:off x="648245" y="288026"/>
+            <a:ext cx="2318263" cy="496996"/>
+          </a:xfrm>
+          <a:prstGeom prst="rect">
+            <a:avLst/>
+          </a:prstGeom>
+        </p:spPr>
+        <p:txBody>
+          <a:bodyPr wrap="none">
+            <a:spAutoFit/>
+          </a:bodyPr>
+          <a:lstStyle/>
+          <a:p>
+            <a:pPr algn="just">
+              <a:lnSpc>
+                <a:spcPct val="150000"/>
+              </a:lnSpc>
+              <a:spcBef>
+                <a:spcPts val="200"/>
+              </a:spcBef>
+              <a:spcAft>
+                <a:spcPts val="0"/>
+              </a:spcAft>
+            </a:pPr>
+            <a:r>
+              <a:rPr lang="fr-FR" sz="2000" b="1" dirty="0">
+                <a:solidFill>
+                  <a:srgbClr val="2E74B5"/>
+                </a:solidFill>
+                <a:latin typeface="Arial" panose="020B0604020202020204" pitchFamily="34" charset="0"/>
+                <a:cs typeface="Times New Roman" panose="02020603050405020304" pitchFamily="18" charset="0"/>
+              </a:rPr>
+              <a:t>4. Question finale</a:t>
+            </a:r>
+          </a:p>
+        </p:txBody>
+      </p:sp>
+      <p:sp>
+        <p:nvSpPr>
+          <p:cNvPr id="6" name="Rectangle 3">
+            <a:extLst>
+              <a:ext uri="{FF2B5EF4-FFF2-40B4-BE49-F238E27FC236}">
+                <a16:creationId xmlns:a16="http://schemas.microsoft.com/office/drawing/2014/main" id="{C49CE132-C670-544E-A6AB-88C14FAB759B}"/>
+              </a:ext>
+            </a:extLst>
+          </p:cNvPr>
+          <p:cNvSpPr/>
+          <p:nvPr/>
+        </p:nvSpPr>
+        <p:spPr>
+          <a:xfrm>
+            <a:off x="973073" y="6329490"/>
+            <a:ext cx="10380727" cy="400110"/>
           </a:xfrm>
           <a:prstGeom prst="rect">
             <a:avLst/>
@@ -7370,15 +7596,71 @@
                   </a:schemeClr>
                 </a:solidFill>
               </a:rPr>
-              <a:t>] pour continuer</a:t>
-            </a:r>
-          </a:p>
-        </p:txBody>
-      </p:sp>
+              <a:t>] pour continuer ou sur la flèche gauche [</a:t>
+            </a:r>
+            <a:r>
+              <a:rPr lang="fr-FR" sz="2000" i="1" dirty="0">
+                <a:solidFill>
+                  <a:schemeClr val="tx1">
+                    <a:lumMod val="50000"/>
+                    <a:lumOff val="50000"/>
+                  </a:schemeClr>
+                </a:solidFill>
+                <a:sym typeface="Wingdings" pitchFamily="2" charset="2"/>
+              </a:rPr>
+              <a:t>] pour revenir en arrière</a:t>
+            </a:r>
+            <a:endParaRPr lang="fr-FR" sz="2000" i="1" dirty="0">
+              <a:solidFill>
+                <a:schemeClr val="tx1">
+                  <a:lumMod val="50000"/>
+                  <a:lumOff val="50000"/>
+                </a:schemeClr>
+              </a:solidFill>
+            </a:endParaRPr>
+          </a:p>
+        </p:txBody>
+      </p:sp>
+      <p:pic>
+        <p:nvPicPr>
+          <p:cNvPr id="10" name="Imagen 9" descr="Captura de pantalla de un celular con texto&#10;&#10;Descripción generada automáticamente">
+            <a:extLst>
+              <a:ext uri="{FF2B5EF4-FFF2-40B4-BE49-F238E27FC236}">
+                <a16:creationId xmlns:a16="http://schemas.microsoft.com/office/drawing/2014/main" id="{92299531-E646-3F46-A73C-E74CEBA665F8}"/>
+              </a:ext>
+            </a:extLst>
+          </p:cNvPr>
+          <p:cNvPicPr>
+            <a:picLocks noChangeAspect="1"/>
+          </p:cNvPicPr>
+          <p:nvPr/>
+        </p:nvPicPr>
+        <p:blipFill>
+          <a:blip r:embed="rId2">
+            <a:extLst>
+              <a:ext uri="{28A0092B-C50C-407E-A947-70E740481C1C}">
+                <a14:useLocalDpi xmlns:a14="http://schemas.microsoft.com/office/drawing/2010/main" val="0"/>
+              </a:ext>
+            </a:extLst>
+          </a:blip>
+          <a:stretch>
+            <a:fillRect/>
+          </a:stretch>
+        </p:blipFill>
+        <p:spPr>
+          <a:xfrm>
+            <a:off x="580235" y="2402500"/>
+            <a:ext cx="11166401" cy="2681375"/>
+          </a:xfrm>
+          <a:prstGeom prst="rect">
+            <a:avLst/>
+          </a:prstGeom>
+        </p:spPr>
+      </p:pic>
     </p:spTree>
     <p:extLst>
       <p:ext uri="{BB962C8B-B14F-4D97-AF65-F5344CB8AC3E}">
-        <p14:creationId xmlns:p14="http://schemas.microsoft.com/office/powerpoint/2010/main" val="246414199"/>
+        <p14:creationId xmlns:p14="http://schemas.microsoft.com/office/powerpoint/2010/main" val="906590627"/>
       </p:ext>
     </p:extLst>
   </p:cSld>
@@ -7507,7 +7789,7 @@
             <a:pPr algn="ctr"/>
             <a:r>
               <a:rPr lang="fr-FR" dirty="0"/>
-              <a:t>Entrainement – Phase Prédiction</a:t>
+              <a:t>Entrainement – Phase Décision</a:t>
             </a:r>
           </a:p>
         </p:txBody>
@@ -7579,7 +7861,7 @@
     </p:spTree>
     <p:extLst>
       <p:ext uri="{BB962C8B-B14F-4D97-AF65-F5344CB8AC3E}">
-        <p14:creationId xmlns:p14="http://schemas.microsoft.com/office/powerpoint/2010/main" val="1201254129"/>
+        <p14:creationId xmlns:p14="http://schemas.microsoft.com/office/powerpoint/2010/main" val="246414199"/>
       </p:ext>
     </p:extLst>
   </p:cSld>

</xml_diff>